<commit_message>
updated pseudo code plan
</commit_message>
<xml_diff>
--- a/Goose-Feed-Game.pptx
+++ b/Goose-Feed-Game.pptx
@@ -9,8 +9,10 @@
     <p:sldId id="257" r:id="rId3"/>
     <p:sldId id="258" r:id="rId4"/>
     <p:sldId id="259" r:id="rId5"/>
-    <p:sldId id="260" r:id="rId6"/>
-    <p:sldId id="261" r:id="rId7"/>
+    <p:sldId id="262" r:id="rId6"/>
+    <p:sldId id="263" r:id="rId7"/>
+    <p:sldId id="260" r:id="rId8"/>
+    <p:sldId id="261" r:id="rId9"/>
   </p:sldIdLst>
   <p:sldSz cx="12192000" cy="6858000"/>
   <p:notesSz cx="6858000" cy="9144000"/>
@@ -109,6 +111,11 @@
       </a:defRPr>
     </a:lvl9pPr>
   </p:defaultTextStyle>
+  <p:extLst>
+    <p:ext uri="{EFAFB233-063F-42B5-8137-9DF3F51BA10A}">
+      <p15:sldGuideLst xmlns:p15="http://schemas.microsoft.com/office/powerpoint/2012/main"/>
+    </p:ext>
+  </p:extLst>
 </p:presentation>
 </file>
 
@@ -261,7 +268,7 @@
           <a:p>
             <a:fld id="{A0061581-3EDB-4D8C-9A53-87B68CB6D996}" type="datetimeFigureOut">
               <a:rPr lang="en-GB" smtClean="0"/>
-              <a:t>26/01/2023</a:t>
+              <a:t>27/01/2023</a:t>
             </a:fld>
             <a:endParaRPr lang="en-GB"/>
           </a:p>
@@ -461,7 +468,7 @@
           <a:p>
             <a:fld id="{A0061581-3EDB-4D8C-9A53-87B68CB6D996}" type="datetimeFigureOut">
               <a:rPr lang="en-GB" smtClean="0"/>
-              <a:t>26/01/2023</a:t>
+              <a:t>27/01/2023</a:t>
             </a:fld>
             <a:endParaRPr lang="en-GB"/>
           </a:p>
@@ -671,7 +678,7 @@
           <a:p>
             <a:fld id="{A0061581-3EDB-4D8C-9A53-87B68CB6D996}" type="datetimeFigureOut">
               <a:rPr lang="en-GB" smtClean="0"/>
-              <a:t>26/01/2023</a:t>
+              <a:t>27/01/2023</a:t>
             </a:fld>
             <a:endParaRPr lang="en-GB"/>
           </a:p>
@@ -871,7 +878,7 @@
           <a:p>
             <a:fld id="{A0061581-3EDB-4D8C-9A53-87B68CB6D996}" type="datetimeFigureOut">
               <a:rPr lang="en-GB" smtClean="0"/>
-              <a:t>26/01/2023</a:t>
+              <a:t>27/01/2023</a:t>
             </a:fld>
             <a:endParaRPr lang="en-GB"/>
           </a:p>
@@ -1147,7 +1154,7 @@
           <a:p>
             <a:fld id="{A0061581-3EDB-4D8C-9A53-87B68CB6D996}" type="datetimeFigureOut">
               <a:rPr lang="en-GB" smtClean="0"/>
-              <a:t>26/01/2023</a:t>
+              <a:t>27/01/2023</a:t>
             </a:fld>
             <a:endParaRPr lang="en-GB"/>
           </a:p>
@@ -1415,7 +1422,7 @@
           <a:p>
             <a:fld id="{A0061581-3EDB-4D8C-9A53-87B68CB6D996}" type="datetimeFigureOut">
               <a:rPr lang="en-GB" smtClean="0"/>
-              <a:t>26/01/2023</a:t>
+              <a:t>27/01/2023</a:t>
             </a:fld>
             <a:endParaRPr lang="en-GB"/>
           </a:p>
@@ -1830,7 +1837,7 @@
           <a:p>
             <a:fld id="{A0061581-3EDB-4D8C-9A53-87B68CB6D996}" type="datetimeFigureOut">
               <a:rPr lang="en-GB" smtClean="0"/>
-              <a:t>26/01/2023</a:t>
+              <a:t>27/01/2023</a:t>
             </a:fld>
             <a:endParaRPr lang="en-GB"/>
           </a:p>
@@ -1972,7 +1979,7 @@
           <a:p>
             <a:fld id="{A0061581-3EDB-4D8C-9A53-87B68CB6D996}" type="datetimeFigureOut">
               <a:rPr lang="en-GB" smtClean="0"/>
-              <a:t>26/01/2023</a:t>
+              <a:t>27/01/2023</a:t>
             </a:fld>
             <a:endParaRPr lang="en-GB"/>
           </a:p>
@@ -2085,7 +2092,7 @@
           <a:p>
             <a:fld id="{A0061581-3EDB-4D8C-9A53-87B68CB6D996}" type="datetimeFigureOut">
               <a:rPr lang="en-GB" smtClean="0"/>
-              <a:t>26/01/2023</a:t>
+              <a:t>27/01/2023</a:t>
             </a:fld>
             <a:endParaRPr lang="en-GB"/>
           </a:p>
@@ -2398,7 +2405,7 @@
           <a:p>
             <a:fld id="{A0061581-3EDB-4D8C-9A53-87B68CB6D996}" type="datetimeFigureOut">
               <a:rPr lang="en-GB" smtClean="0"/>
-              <a:t>26/01/2023</a:t>
+              <a:t>27/01/2023</a:t>
             </a:fld>
             <a:endParaRPr lang="en-GB"/>
           </a:p>
@@ -2687,7 +2694,7 @@
           <a:p>
             <a:fld id="{A0061581-3EDB-4D8C-9A53-87B68CB6D996}" type="datetimeFigureOut">
               <a:rPr lang="en-GB" smtClean="0"/>
-              <a:t>26/01/2023</a:t>
+              <a:t>27/01/2023</a:t>
             </a:fld>
             <a:endParaRPr lang="en-GB"/>
           </a:p>
@@ -2930,7 +2937,7 @@
           <a:p>
             <a:fld id="{A0061581-3EDB-4D8C-9A53-87B68CB6D996}" type="datetimeFigureOut">
               <a:rPr lang="en-GB" smtClean="0"/>
-              <a:t>26/01/2023</a:t>
+              <a:t>27/01/2023</a:t>
             </a:fld>
             <a:endParaRPr lang="en-GB"/>
           </a:p>
@@ -4157,7 +4164,19 @@
             <a:prstGeom prst="rect">
               <a:avLst/>
             </a:prstGeom>
-            <a:noFill/>
+            <a:blipFill dpi="0" rotWithShape="1">
+              <a:blip r:embed="rId2">
+                <a:extLst>
+                  <a:ext uri="{28A0092B-C50C-407E-A947-70E740481C1C}">
+                    <a14:useLocalDpi xmlns:a14="http://schemas.microsoft.com/office/drawing/2010/main" val="0"/>
+                  </a:ext>
+                </a:extLst>
+              </a:blip>
+              <a:srcRect/>
+              <a:stretch>
+                <a:fillRect/>
+              </a:stretch>
+            </a:blipFill>
             <a:ln w="76200">
               <a:solidFill>
                 <a:schemeClr val="tx1"/>
@@ -4268,7 +4287,19 @@
             <a:prstGeom prst="rect">
               <a:avLst/>
             </a:prstGeom>
-            <a:noFill/>
+            <a:blipFill dpi="0" rotWithShape="1">
+              <a:blip r:embed="rId2">
+                <a:extLst>
+                  <a:ext uri="{28A0092B-C50C-407E-A947-70E740481C1C}">
+                    <a14:useLocalDpi xmlns:a14="http://schemas.microsoft.com/office/drawing/2010/main" val="0"/>
+                  </a:ext>
+                </a:extLst>
+              </a:blip>
+              <a:srcRect/>
+              <a:stretch>
+                <a:fillRect/>
+              </a:stretch>
+            </a:blipFill>
             <a:ln w="76200">
               <a:solidFill>
                 <a:schemeClr val="tx1"/>
@@ -4347,9 +4378,7 @@
               <a:prstGeom prst="ellipse">
                 <a:avLst/>
               </a:prstGeom>
-              <a:solidFill>
-                <a:schemeClr val="bg1"/>
-              </a:solidFill>
+              <a:noFill/>
               <a:ln w="76200">
                 <a:solidFill>
                   <a:schemeClr val="tx1"/>
@@ -4476,9 +4505,7 @@
               <a:prstGeom prst="ellipse">
                 <a:avLst/>
               </a:prstGeom>
-              <a:solidFill>
-                <a:schemeClr val="bg1"/>
-              </a:solidFill>
+              <a:noFill/>
               <a:ln w="76200">
                 <a:solidFill>
                   <a:schemeClr val="tx1"/>
@@ -4605,9 +4632,7 @@
               <a:prstGeom prst="ellipse">
                 <a:avLst/>
               </a:prstGeom>
-              <a:solidFill>
-                <a:schemeClr val="bg1"/>
-              </a:solidFill>
+              <a:noFill/>
               <a:ln w="76200">
                 <a:solidFill>
                   <a:schemeClr val="tx1"/>
@@ -4734,9 +4759,7 @@
               <a:prstGeom prst="ellipse">
                 <a:avLst/>
               </a:prstGeom>
-              <a:solidFill>
-                <a:schemeClr val="bg1"/>
-              </a:solidFill>
+              <a:noFill/>
               <a:ln w="76200">
                 <a:solidFill>
                   <a:schemeClr val="tx1"/>
@@ -4844,14 +4867,10 @@
           <a:prstGeom prst="rect">
             <a:avLst/>
           </a:prstGeom>
-          <a:solidFill>
-            <a:schemeClr val="bg1"/>
-          </a:solidFill>
+          <a:noFill/>
           <a:ln w="57150">
             <a:solidFill>
-              <a:schemeClr val="accent6">
-                <a:lumMod val="50000"/>
-              </a:schemeClr>
+              <a:srgbClr val="FF0000"/>
             </a:solidFill>
           </a:ln>
         </p:spPr>
@@ -4877,18 +4896,13 @@
           <a:p>
             <a:pPr algn="ctr"/>
             <a:r>
-              <a:rPr lang="en-GB" dirty="0" err="1">
+              <a:rPr lang="en-GB" dirty="0">
                 <a:solidFill>
                   <a:sysClr val="windowText" lastClr="000000"/>
                 </a:solidFill>
               </a:rPr>
-              <a:t>Benginingg</a:t>
-            </a:r>
-            <a:endParaRPr lang="en-GB" dirty="0">
-              <a:solidFill>
-                <a:sysClr val="windowText" lastClr="000000"/>
-              </a:solidFill>
-            </a:endParaRPr>
+              <a:t>(Re)Start</a:t>
+            </a:r>
           </a:p>
         </p:txBody>
       </p:sp>
@@ -4907,7 +4921,7 @@
           <p:nvPr/>
         </p:nvPicPr>
         <p:blipFill>
-          <a:blip r:embed="rId2">
+          <a:blip r:embed="rId3">
             <a:extLst>
               <a:ext uri="{28A0092B-C50C-407E-A947-70E740481C1C}">
                 <a14:useLocalDpi xmlns:a14="http://schemas.microsoft.com/office/drawing/2010/main" val="0"/>
@@ -4920,8 +4934,8 @@
         </p:blipFill>
         <p:spPr>
           <a:xfrm>
-            <a:off x="9068603" y="1707072"/>
-            <a:ext cx="2829861" cy="2829861"/>
+            <a:off x="9068604" y="1789472"/>
+            <a:ext cx="2499360" cy="2499360"/>
           </a:xfrm>
           <a:prstGeom prst="rect">
             <a:avLst/>
@@ -4958,12 +4972,9 @@
           <a:p>
             <a:r>
               <a:rPr lang="en-GB" dirty="0"/>
-              <a:t>Geese are the </a:t>
-            </a:r>
-            <a:r>
-              <a:rPr lang="en-GB" i="1" dirty="0"/>
-              <a:t>Targets</a:t>
-            </a:r>
+              <a:t>Goose Icon</a:t>
+            </a:r>
+            <a:endParaRPr lang="en-GB" i="1" dirty="0"/>
           </a:p>
         </p:txBody>
       </p:sp>
@@ -4997,12 +5008,143 @@
           <a:chExt cx="0" cy="0"/>
         </a:xfrm>
       </p:grpSpPr>
-      <p:sp>
-        <p:nvSpPr>
-          <p:cNvPr id="3" name="TextBox 2">
-            <a:extLst>
-              <a:ext uri="{FF2B5EF4-FFF2-40B4-BE49-F238E27FC236}">
-                <a16:creationId xmlns:a16="http://schemas.microsoft.com/office/drawing/2014/main" id="{3012064E-866D-5879-D6F3-7F93B93FA6C6}"/>
+      <p:grpSp>
+        <p:nvGrpSpPr>
+          <p:cNvPr id="4" name="Group 3">
+            <a:extLst>
+              <a:ext uri="{FF2B5EF4-FFF2-40B4-BE49-F238E27FC236}">
+                <a16:creationId xmlns:a16="http://schemas.microsoft.com/office/drawing/2014/main" id="{AB2B609A-7985-87E8-362E-0E12149A3548}"/>
+              </a:ext>
+            </a:extLst>
+          </p:cNvPr>
+          <p:cNvGrpSpPr/>
+          <p:nvPr/>
+        </p:nvGrpSpPr>
+        <p:grpSpPr>
+          <a:xfrm>
+            <a:off x="1511559" y="1363973"/>
+            <a:ext cx="7977674" cy="1894114"/>
+            <a:chOff x="1511559" y="1380930"/>
+            <a:chExt cx="7977674" cy="1894114"/>
+          </a:xfrm>
+        </p:grpSpPr>
+        <p:sp>
+          <p:nvSpPr>
+            <p:cNvPr id="3" name="Rectangle 2">
+              <a:extLst>
+                <a:ext uri="{FF2B5EF4-FFF2-40B4-BE49-F238E27FC236}">
+                  <a16:creationId xmlns:a16="http://schemas.microsoft.com/office/drawing/2014/main" id="{828317E1-FAB6-7045-D696-9A27F956DADA}"/>
+                </a:ext>
+              </a:extLst>
+            </p:cNvPr>
+            <p:cNvSpPr/>
+            <p:nvPr/>
+          </p:nvSpPr>
+          <p:spPr>
+            <a:xfrm>
+              <a:off x="1511559" y="1380930"/>
+              <a:ext cx="7977674" cy="1894114"/>
+            </a:xfrm>
+            <a:prstGeom prst="rect">
+              <a:avLst/>
+            </a:prstGeom>
+            <a:solidFill>
+              <a:schemeClr val="accent1">
+                <a:lumMod val="75000"/>
+              </a:schemeClr>
+            </a:solidFill>
+            <a:ln w="76200">
+              <a:solidFill>
+                <a:schemeClr val="tx1"/>
+              </a:solidFill>
+            </a:ln>
+          </p:spPr>
+          <p:style>
+            <a:lnRef idx="2">
+              <a:schemeClr val="accent1">
+                <a:shade val="50000"/>
+              </a:schemeClr>
+            </a:lnRef>
+            <a:fillRef idx="1">
+              <a:schemeClr val="accent1"/>
+            </a:fillRef>
+            <a:effectRef idx="0">
+              <a:schemeClr val="accent1"/>
+            </a:effectRef>
+            <a:fontRef idx="minor">
+              <a:schemeClr val="lt1"/>
+            </a:fontRef>
+          </p:style>
+          <p:txBody>
+            <a:bodyPr rtlCol="0" anchor="ctr"/>
+            <a:lstStyle/>
+            <a:p>
+              <a:pPr algn="ctr"/>
+              <a:endParaRPr lang="en-GB" dirty="0"/>
+            </a:p>
+          </p:txBody>
+        </p:sp>
+        <p:sp>
+          <p:nvSpPr>
+            <p:cNvPr id="2" name="Cloud 1">
+              <a:extLst>
+                <a:ext uri="{FF2B5EF4-FFF2-40B4-BE49-F238E27FC236}">
+                  <a16:creationId xmlns:a16="http://schemas.microsoft.com/office/drawing/2014/main" id="{E5986B7E-F9A7-E0DA-0586-3726655D5462}"/>
+                </a:ext>
+              </a:extLst>
+            </p:cNvPr>
+            <p:cNvSpPr/>
+            <p:nvPr/>
+          </p:nvSpPr>
+          <p:spPr>
+            <a:xfrm>
+              <a:off x="1595535" y="1455575"/>
+              <a:ext cx="7828383" cy="1744825"/>
+            </a:xfrm>
+            <a:prstGeom prst="cloud">
+              <a:avLst/>
+            </a:prstGeom>
+            <a:solidFill>
+              <a:schemeClr val="bg1"/>
+            </a:solidFill>
+            <a:ln>
+              <a:solidFill>
+                <a:schemeClr val="tx1"/>
+              </a:solidFill>
+            </a:ln>
+          </p:spPr>
+          <p:style>
+            <a:lnRef idx="2">
+              <a:schemeClr val="accent1">
+                <a:shade val="50000"/>
+              </a:schemeClr>
+            </a:lnRef>
+            <a:fillRef idx="1">
+              <a:schemeClr val="accent1"/>
+            </a:fillRef>
+            <a:effectRef idx="0">
+              <a:schemeClr val="accent1"/>
+            </a:effectRef>
+            <a:fontRef idx="minor">
+              <a:schemeClr val="lt1"/>
+            </a:fontRef>
+          </p:style>
+          <p:txBody>
+            <a:bodyPr rtlCol="0" anchor="ctr"/>
+            <a:lstStyle/>
+            <a:p>
+              <a:pPr algn="ctr"/>
+              <a:endParaRPr lang="en-GB"/>
+            </a:p>
+          </p:txBody>
+        </p:sp>
+      </p:grpSp>
+      <p:sp>
+        <p:nvSpPr>
+          <p:cNvPr id="5" name="TextBox 4">
+            <a:extLst>
+              <a:ext uri="{FF2B5EF4-FFF2-40B4-BE49-F238E27FC236}">
+                <a16:creationId xmlns:a16="http://schemas.microsoft.com/office/drawing/2014/main" id="{19C9A347-4D60-D617-A7DC-43B9C69503CD}"/>
               </a:ext>
             </a:extLst>
           </p:cNvPr>
@@ -5011,8 +5153,8 @@
         </p:nvSpPr>
         <p:spPr>
           <a:xfrm>
-            <a:off x="863600" y="623054"/>
-            <a:ext cx="6096000" cy="369332"/>
+            <a:off x="1511559" y="374113"/>
+            <a:ext cx="7828383" cy="646331"/>
           </a:xfrm>
           <a:prstGeom prst="rect">
             <a:avLst/>
@@ -5020,28 +5162,28 @@
           <a:noFill/>
         </p:spPr>
         <p:txBody>
-          <a:bodyPr wrap="square">
+          <a:bodyPr wrap="square" rtlCol="0">
             <a:spAutoFit/>
           </a:bodyPr>
           <a:lstStyle/>
           <a:p>
             <a:r>
-              <a:rPr lang="en-GB" u="sng" dirty="0"/>
-              <a:t>Secondary goal:</a:t>
-            </a:r>
-            <a:r>
-              <a:rPr lang="en-GB" dirty="0"/>
-              <a:t> Introduce scores and rounds</a:t>
-            </a:r>
-          </a:p>
-        </p:txBody>
-      </p:sp>
-      <p:sp>
-        <p:nvSpPr>
-          <p:cNvPr id="4" name="TextBox 3">
-            <a:extLst>
-              <a:ext uri="{FF2B5EF4-FFF2-40B4-BE49-F238E27FC236}">
-                <a16:creationId xmlns:a16="http://schemas.microsoft.com/office/drawing/2014/main" id="{F8E1C6E1-15E5-B67B-1264-FF5F09E6D8C7}"/>
+              <a:rPr lang="en-GB" dirty="0" err="1"/>
+              <a:t>headerDiv</a:t>
+            </a:r>
+            <a:r>
+              <a:rPr lang="en-GB" dirty="0"/>
+              <a:t> with background image as a cloud and information strategically placed on it to house buttons and appear as a div shaped like a cloud</a:t>
+            </a:r>
+          </a:p>
+        </p:txBody>
+      </p:sp>
+      <p:sp>
+        <p:nvSpPr>
+          <p:cNvPr id="6" name="TextBox 5">
+            <a:extLst>
+              <a:ext uri="{FF2B5EF4-FFF2-40B4-BE49-F238E27FC236}">
+                <a16:creationId xmlns:a16="http://schemas.microsoft.com/office/drawing/2014/main" id="{79AFE54C-30F7-98E5-7D00-E8EF2D75CC1F}"/>
               </a:ext>
             </a:extLst>
           </p:cNvPr>
@@ -5050,8 +5192,8 @@
         </p:nvSpPr>
         <p:spPr>
           <a:xfrm>
-            <a:off x="985520" y="1280160"/>
-            <a:ext cx="8128000" cy="1200329"/>
+            <a:off x="7483151" y="3601616"/>
+            <a:ext cx="2771192" cy="646331"/>
           </a:xfrm>
           <a:prstGeom prst="rect">
             <a:avLst/>
@@ -5066,33 +5208,7 @@
           <a:p>
             <a:r>
               <a:rPr lang="en-GB" dirty="0"/>
-              <a:t>This will be implemented via a score counter on the geese</a:t>
-            </a:r>
-          </a:p>
-          <a:p>
-            <a:r>
-              <a:rPr lang="en-GB" dirty="0"/>
-              <a:t>Can use a while, while score &lt; </a:t>
-            </a:r>
-            <a:r>
-              <a:rPr lang="en-GB" dirty="0" err="1"/>
-              <a:t>xso</a:t>
-            </a:r>
-            <a:r>
-              <a:rPr lang="en-GB" dirty="0"/>
-              <a:t> when score = x clears screen.</a:t>
-            </a:r>
-          </a:p>
-          <a:p>
-            <a:r>
-              <a:rPr lang="en-GB" dirty="0"/>
-              <a:t>Displays round next. Round score set to zero and total score is kept track. </a:t>
-            </a:r>
-          </a:p>
-          <a:p>
-            <a:r>
-              <a:rPr lang="en-GB" dirty="0"/>
-              <a:t>Round counter changed when no geese are on screen</a:t>
+              <a:t>Blue and border removed in realisation</a:t>
             </a:r>
           </a:p>
         </p:txBody>
@@ -5100,7 +5216,7 @@
     </p:spTree>
     <p:extLst>
       <p:ext uri="{BB962C8B-B14F-4D97-AF65-F5344CB8AC3E}">
-        <p14:creationId xmlns:p14="http://schemas.microsoft.com/office/powerpoint/2010/main" val="3132058577"/>
+        <p14:creationId xmlns:p14="http://schemas.microsoft.com/office/powerpoint/2010/main" val="225452388"/>
       </p:ext>
     </p:extLst>
   </p:cSld>
@@ -5132,7 +5248,7 @@
           <p:cNvPr id="2" name="TextBox 1">
             <a:extLst>
               <a:ext uri="{FF2B5EF4-FFF2-40B4-BE49-F238E27FC236}">
-                <a16:creationId xmlns:a16="http://schemas.microsoft.com/office/drawing/2014/main" id="{52E5B912-AB0F-3AA4-7700-FF3162924B66}"/>
+                <a16:creationId xmlns:a16="http://schemas.microsoft.com/office/drawing/2014/main" id="{87FE92F5-E4B6-C2CE-7BAE-7E19036526CD}"/>
               </a:ext>
             </a:extLst>
           </p:cNvPr>
@@ -5141,8 +5257,8 @@
         </p:nvSpPr>
         <p:spPr>
           <a:xfrm>
-            <a:off x="548640" y="609600"/>
-            <a:ext cx="6146800" cy="1477328"/>
+            <a:off x="942392" y="522514"/>
+            <a:ext cx="10982130" cy="923330"/>
           </a:xfrm>
           <a:prstGeom prst="rect">
             <a:avLst/>
@@ -5157,10 +5273,222 @@
           <a:p>
             <a:r>
               <a:rPr lang="en-GB" dirty="0"/>
+              <a:t>27/01 - Functional frame of game works. </a:t>
+            </a:r>
+          </a:p>
+          <a:p>
+            <a:endParaRPr lang="en-GB" dirty="0"/>
+          </a:p>
+          <a:p>
+            <a:pPr marL="285750" indent="-285750">
+              <a:buFont typeface="Arial" panose="020B0604020202020204" pitchFamily="34" charset="0"/>
+              <a:buChar char="•"/>
+            </a:pPr>
+            <a:r>
+              <a:rPr lang="en-GB" dirty="0"/>
+              <a:t>To finish main JS goal geese need to appear and disappear after a time interval</a:t>
+            </a:r>
+          </a:p>
+        </p:txBody>
+      </p:sp>
+    </p:spTree>
+    <p:extLst>
+      <p:ext uri="{BB962C8B-B14F-4D97-AF65-F5344CB8AC3E}">
+        <p14:creationId xmlns:p14="http://schemas.microsoft.com/office/powerpoint/2010/main" val="590187170"/>
+      </p:ext>
+    </p:extLst>
+  </p:cSld>
+  <p:clrMapOvr>
+    <a:masterClrMapping/>
+  </p:clrMapOvr>
+</p:sld>
+</file>
+
+<file path=ppt/slides/slide7.xml><?xml version="1.0" encoding="utf-8"?>
+<p:sld xmlns:a="http://schemas.openxmlformats.org/drawingml/2006/main" xmlns:r="http://schemas.openxmlformats.org/officeDocument/2006/relationships" xmlns:p="http://schemas.openxmlformats.org/presentationml/2006/main">
+  <p:cSld>
+    <p:spTree>
+      <p:nvGrpSpPr>
+        <p:cNvPr id="1" name=""/>
+        <p:cNvGrpSpPr/>
+        <p:nvPr/>
+      </p:nvGrpSpPr>
+      <p:grpSpPr>
+        <a:xfrm>
+          <a:off x="0" y="0"/>
+          <a:ext cx="0" cy="0"/>
+          <a:chOff x="0" y="0"/>
+          <a:chExt cx="0" cy="0"/>
+        </a:xfrm>
+      </p:grpSpPr>
+      <p:sp>
+        <p:nvSpPr>
+          <p:cNvPr id="3" name="TextBox 2">
+            <a:extLst>
+              <a:ext uri="{FF2B5EF4-FFF2-40B4-BE49-F238E27FC236}">
+                <a16:creationId xmlns:a16="http://schemas.microsoft.com/office/drawing/2014/main" id="{3012064E-866D-5879-D6F3-7F93B93FA6C6}"/>
+              </a:ext>
+            </a:extLst>
+          </p:cNvPr>
+          <p:cNvSpPr txBox="1"/>
+          <p:nvPr/>
+        </p:nvSpPr>
+        <p:spPr>
+          <a:xfrm>
+            <a:off x="863600" y="623054"/>
+            <a:ext cx="6096000" cy="369332"/>
+          </a:xfrm>
+          <a:prstGeom prst="rect">
+            <a:avLst/>
+          </a:prstGeom>
+          <a:noFill/>
+        </p:spPr>
+        <p:txBody>
+          <a:bodyPr wrap="square">
+            <a:spAutoFit/>
+          </a:bodyPr>
+          <a:lstStyle/>
+          <a:p>
+            <a:r>
+              <a:rPr lang="en-GB" u="sng" dirty="0"/>
+              <a:t>Secondary goal:</a:t>
+            </a:r>
+            <a:r>
+              <a:rPr lang="en-GB" dirty="0"/>
+              <a:t> Introduce scores and rounds</a:t>
+            </a:r>
+          </a:p>
+        </p:txBody>
+      </p:sp>
+      <p:sp>
+        <p:nvSpPr>
+          <p:cNvPr id="4" name="TextBox 3">
+            <a:extLst>
+              <a:ext uri="{FF2B5EF4-FFF2-40B4-BE49-F238E27FC236}">
+                <a16:creationId xmlns:a16="http://schemas.microsoft.com/office/drawing/2014/main" id="{F8E1C6E1-15E5-B67B-1264-FF5F09E6D8C7}"/>
+              </a:ext>
+            </a:extLst>
+          </p:cNvPr>
+          <p:cNvSpPr txBox="1"/>
+          <p:nvPr/>
+        </p:nvSpPr>
+        <p:spPr>
+          <a:xfrm>
+            <a:off x="985520" y="1280160"/>
+            <a:ext cx="8128000" cy="1200329"/>
+          </a:xfrm>
+          <a:prstGeom prst="rect">
+            <a:avLst/>
+          </a:prstGeom>
+          <a:noFill/>
+        </p:spPr>
+        <p:txBody>
+          <a:bodyPr wrap="square" rtlCol="0">
+            <a:spAutoFit/>
+          </a:bodyPr>
+          <a:lstStyle/>
+          <a:p>
+            <a:r>
+              <a:rPr lang="en-GB" dirty="0"/>
+              <a:t>This will be implemented via a score counter on the geese</a:t>
+            </a:r>
+          </a:p>
+          <a:p>
+            <a:r>
+              <a:rPr lang="en-GB" dirty="0"/>
+              <a:t>Can use a while, while score &lt; </a:t>
+            </a:r>
+            <a:r>
+              <a:rPr lang="en-GB" dirty="0" err="1"/>
+              <a:t>xso</a:t>
+            </a:r>
+            <a:r>
+              <a:rPr lang="en-GB" dirty="0"/>
+              <a:t> when score = x clears screen.</a:t>
+            </a:r>
+          </a:p>
+          <a:p>
+            <a:r>
+              <a:rPr lang="en-GB" dirty="0"/>
+              <a:t>Displays round next. Round score set to zero and total score is kept track. </a:t>
+            </a:r>
+          </a:p>
+          <a:p>
+            <a:r>
+              <a:rPr lang="en-GB" dirty="0"/>
+              <a:t>Round counter changed when no geese are on screen</a:t>
+            </a:r>
+          </a:p>
+        </p:txBody>
+      </p:sp>
+    </p:spTree>
+    <p:extLst>
+      <p:ext uri="{BB962C8B-B14F-4D97-AF65-F5344CB8AC3E}">
+        <p14:creationId xmlns:p14="http://schemas.microsoft.com/office/powerpoint/2010/main" val="3132058577"/>
+      </p:ext>
+    </p:extLst>
+  </p:cSld>
+  <p:clrMapOvr>
+    <a:masterClrMapping/>
+  </p:clrMapOvr>
+</p:sld>
+</file>
+
+<file path=ppt/slides/slide8.xml><?xml version="1.0" encoding="utf-8"?>
+<p:sld xmlns:a="http://schemas.openxmlformats.org/drawingml/2006/main" xmlns:r="http://schemas.openxmlformats.org/officeDocument/2006/relationships" xmlns:p="http://schemas.openxmlformats.org/presentationml/2006/main">
+  <p:cSld>
+    <p:spTree>
+      <p:nvGrpSpPr>
+        <p:cNvPr id="1" name=""/>
+        <p:cNvGrpSpPr/>
+        <p:nvPr/>
+      </p:nvGrpSpPr>
+      <p:grpSpPr>
+        <a:xfrm>
+          <a:off x="0" y="0"/>
+          <a:ext cx="0" cy="0"/>
+          <a:chOff x="0" y="0"/>
+          <a:chExt cx="0" cy="0"/>
+        </a:xfrm>
+      </p:grpSpPr>
+      <p:sp>
+        <p:nvSpPr>
+          <p:cNvPr id="2" name="TextBox 1">
+            <a:extLst>
+              <a:ext uri="{FF2B5EF4-FFF2-40B4-BE49-F238E27FC236}">
+                <a16:creationId xmlns:a16="http://schemas.microsoft.com/office/drawing/2014/main" id="{52E5B912-AB0F-3AA4-7700-FF3162924B66}"/>
+              </a:ext>
+            </a:extLst>
+          </p:cNvPr>
+          <p:cNvSpPr txBox="1"/>
+          <p:nvPr/>
+        </p:nvSpPr>
+        <p:spPr>
+          <a:xfrm>
+            <a:off x="548640" y="609600"/>
+            <a:ext cx="6066764" cy="1754326"/>
+          </a:xfrm>
+          <a:prstGeom prst="rect">
+            <a:avLst/>
+          </a:prstGeom>
+          <a:noFill/>
+        </p:spPr>
+        <p:txBody>
+          <a:bodyPr wrap="square" rtlCol="0">
+            <a:spAutoFit/>
+          </a:bodyPr>
+          <a:lstStyle/>
+          <a:p>
+            <a:r>
+              <a:rPr lang="en-GB" dirty="0"/>
               <a:t>Easter (goose) eggs:</a:t>
             </a:r>
           </a:p>
           <a:p>
+            <a:pPr marL="285750" indent="-285750">
+              <a:buFont typeface="Arial" panose="020B0604020202020204" pitchFamily="34" charset="0"/>
+              <a:buChar char="•"/>
+            </a:pPr>
             <a:r>
               <a:rPr lang="en-GB" dirty="0"/>
               <a:t>Game rewards completion with </a:t>
@@ -5177,6 +5505,10 @@
             </a:r>
           </a:p>
           <a:p>
+            <a:pPr marL="285750" indent="-285750">
+              <a:buFont typeface="Arial" panose="020B0604020202020204" pitchFamily="34" charset="0"/>
+              <a:buChar char="•"/>
+            </a:pPr>
             <a:r>
               <a:rPr lang="en-GB" dirty="0">
                 <a:solidFill>
@@ -5188,6 +5520,10 @@
             </a:r>
           </a:p>
           <a:p>
+            <a:pPr marL="285750" indent="-285750">
+              <a:buFont typeface="Arial" panose="020B0604020202020204" pitchFamily="34" charset="0"/>
+              <a:buChar char="•"/>
+            </a:pPr>
             <a:r>
               <a:rPr lang="en-GB" dirty="0">
                 <a:solidFill>
@@ -5218,7 +5554,7 @@
         </p:nvSpPr>
         <p:spPr>
           <a:xfrm>
-            <a:off x="548640" y="516712"/>
+            <a:off x="371357" y="450443"/>
             <a:ext cx="7112000" cy="2072640"/>
           </a:xfrm>
           <a:prstGeom prst="rect">
@@ -5247,12 +5583,28 @@
           <a:p>
             <a:pPr algn="ctr"/>
             <a:r>
-              <a:rPr lang="en-GB" sz="1600" u="sng" dirty="0">
+              <a:rPr lang="en-GB" sz="9600" u="sng" dirty="0">
                 <a:solidFill>
                   <a:srgbClr val="FFC000"/>
                 </a:solidFill>
               </a:rPr>
-              <a:t>No Secrets Here</a:t>
+              <a:t>Lore</a:t>
+            </a:r>
+            <a:r>
+              <a:rPr lang="en-GB" sz="9600" dirty="0">
+                <a:solidFill>
+                  <a:srgbClr val="FFC000"/>
+                </a:solidFill>
+              </a:rPr>
+              <a:t> </a:t>
+            </a:r>
+            <a:r>
+              <a:rPr lang="en-GB" sz="9600" u="sng" dirty="0">
+                <a:solidFill>
+                  <a:srgbClr val="FFC000"/>
+                </a:solidFill>
+              </a:rPr>
+              <a:t>Spoilers</a:t>
             </a:r>
           </a:p>
         </p:txBody>

</xml_diff>

<commit_message>
Psuedo code for level select updated
</commit_message>
<xml_diff>
--- a/Goose-Feed-Game.pptx
+++ b/Goose-Feed-Game.pptx
@@ -12,7 +12,10 @@
     <p:sldId id="262" r:id="rId6"/>
     <p:sldId id="263" r:id="rId7"/>
     <p:sldId id="260" r:id="rId8"/>
-    <p:sldId id="261" r:id="rId9"/>
+    <p:sldId id="264" r:id="rId9"/>
+    <p:sldId id="265" r:id="rId10"/>
+    <p:sldId id="266" r:id="rId11"/>
+    <p:sldId id="261" r:id="rId12"/>
   </p:sldIdLst>
   <p:sldSz cx="12192000" cy="6858000"/>
   <p:notesSz cx="6858000" cy="9144000"/>
@@ -268,7 +271,7 @@
           <a:p>
             <a:fld id="{A0061581-3EDB-4D8C-9A53-87B68CB6D996}" type="datetimeFigureOut">
               <a:rPr lang="en-GB" smtClean="0"/>
-              <a:t>27/01/2023</a:t>
+              <a:t>31/01/2023</a:t>
             </a:fld>
             <a:endParaRPr lang="en-GB"/>
           </a:p>
@@ -468,7 +471,7 @@
           <a:p>
             <a:fld id="{A0061581-3EDB-4D8C-9A53-87B68CB6D996}" type="datetimeFigureOut">
               <a:rPr lang="en-GB" smtClean="0"/>
-              <a:t>27/01/2023</a:t>
+              <a:t>31/01/2023</a:t>
             </a:fld>
             <a:endParaRPr lang="en-GB"/>
           </a:p>
@@ -678,7 +681,7 @@
           <a:p>
             <a:fld id="{A0061581-3EDB-4D8C-9A53-87B68CB6D996}" type="datetimeFigureOut">
               <a:rPr lang="en-GB" smtClean="0"/>
-              <a:t>27/01/2023</a:t>
+              <a:t>31/01/2023</a:t>
             </a:fld>
             <a:endParaRPr lang="en-GB"/>
           </a:p>
@@ -878,7 +881,7 @@
           <a:p>
             <a:fld id="{A0061581-3EDB-4D8C-9A53-87B68CB6D996}" type="datetimeFigureOut">
               <a:rPr lang="en-GB" smtClean="0"/>
-              <a:t>27/01/2023</a:t>
+              <a:t>31/01/2023</a:t>
             </a:fld>
             <a:endParaRPr lang="en-GB"/>
           </a:p>
@@ -1154,7 +1157,7 @@
           <a:p>
             <a:fld id="{A0061581-3EDB-4D8C-9A53-87B68CB6D996}" type="datetimeFigureOut">
               <a:rPr lang="en-GB" smtClean="0"/>
-              <a:t>27/01/2023</a:t>
+              <a:t>31/01/2023</a:t>
             </a:fld>
             <a:endParaRPr lang="en-GB"/>
           </a:p>
@@ -1422,7 +1425,7 @@
           <a:p>
             <a:fld id="{A0061581-3EDB-4D8C-9A53-87B68CB6D996}" type="datetimeFigureOut">
               <a:rPr lang="en-GB" smtClean="0"/>
-              <a:t>27/01/2023</a:t>
+              <a:t>31/01/2023</a:t>
             </a:fld>
             <a:endParaRPr lang="en-GB"/>
           </a:p>
@@ -1837,7 +1840,7 @@
           <a:p>
             <a:fld id="{A0061581-3EDB-4D8C-9A53-87B68CB6D996}" type="datetimeFigureOut">
               <a:rPr lang="en-GB" smtClean="0"/>
-              <a:t>27/01/2023</a:t>
+              <a:t>31/01/2023</a:t>
             </a:fld>
             <a:endParaRPr lang="en-GB"/>
           </a:p>
@@ -1979,7 +1982,7 @@
           <a:p>
             <a:fld id="{A0061581-3EDB-4D8C-9A53-87B68CB6D996}" type="datetimeFigureOut">
               <a:rPr lang="en-GB" smtClean="0"/>
-              <a:t>27/01/2023</a:t>
+              <a:t>31/01/2023</a:t>
             </a:fld>
             <a:endParaRPr lang="en-GB"/>
           </a:p>
@@ -2092,7 +2095,7 @@
           <a:p>
             <a:fld id="{A0061581-3EDB-4D8C-9A53-87B68CB6D996}" type="datetimeFigureOut">
               <a:rPr lang="en-GB" smtClean="0"/>
-              <a:t>27/01/2023</a:t>
+              <a:t>31/01/2023</a:t>
             </a:fld>
             <a:endParaRPr lang="en-GB"/>
           </a:p>
@@ -2405,7 +2408,7 @@
           <a:p>
             <a:fld id="{A0061581-3EDB-4D8C-9A53-87B68CB6D996}" type="datetimeFigureOut">
               <a:rPr lang="en-GB" smtClean="0"/>
-              <a:t>27/01/2023</a:t>
+              <a:t>31/01/2023</a:t>
             </a:fld>
             <a:endParaRPr lang="en-GB"/>
           </a:p>
@@ -2694,7 +2697,7 @@
           <a:p>
             <a:fld id="{A0061581-3EDB-4D8C-9A53-87B68CB6D996}" type="datetimeFigureOut">
               <a:rPr lang="en-GB" smtClean="0"/>
-              <a:t>27/01/2023</a:t>
+              <a:t>31/01/2023</a:t>
             </a:fld>
             <a:endParaRPr lang="en-GB"/>
           </a:p>
@@ -2937,7 +2940,7 @@
           <a:p>
             <a:fld id="{A0061581-3EDB-4D8C-9A53-87B68CB6D996}" type="datetimeFigureOut">
               <a:rPr lang="en-GB" smtClean="0"/>
-              <a:t>27/01/2023</a:t>
+              <a:t>31/01/2023</a:t>
             </a:fld>
             <a:endParaRPr lang="en-GB"/>
           </a:p>
@@ -3426,7 +3429,7 @@
         <p:spPr>
           <a:xfrm>
             <a:off x="1632856" y="1184988"/>
-            <a:ext cx="6811347" cy="2031325"/>
+            <a:ext cx="9695544" cy="2585323"/>
           </a:xfrm>
           <a:prstGeom prst="rect">
             <a:avLst/>
@@ -3445,7 +3448,28 @@
             </a:r>
             <a:r>
               <a:rPr lang="en-GB" dirty="0"/>
-              <a:t>Targets appear then disappear after time interval or clicked</a:t>
+              <a:t>Targets appear then disappear after time interval or clicked </a:t>
+            </a:r>
+            <a:r>
+              <a:rPr lang="en-GB" dirty="0">
+                <a:solidFill>
+                  <a:srgbClr val="00B050"/>
+                </a:solidFill>
+              </a:rPr>
+              <a:t>TICK </a:t>
+            </a:r>
+            <a:r>
+              <a:rPr lang="en-GB" dirty="0">
+                <a:solidFill>
+                  <a:srgbClr val="00B050"/>
+                </a:solidFill>
+                <a:sym typeface="Wingdings" panose="05000000000000000000" pitchFamily="2" charset="2"/>
+              </a:rPr>
+              <a:t></a:t>
+            </a:r>
+            <a:r>
+              <a:rPr lang="en-GB" dirty="0"/>
+              <a:t> </a:t>
             </a:r>
           </a:p>
           <a:p>
@@ -3461,7 +3485,28 @@
             </a:r>
             <a:r>
               <a:rPr lang="en-GB" dirty="0"/>
-              <a:t> Introduce scores and rounds</a:t>
+              <a:t> Introduce scores and 10 rounds </a:t>
+            </a:r>
+            <a:r>
+              <a:rPr lang="en-GB" dirty="0">
+                <a:solidFill>
+                  <a:srgbClr val="00B050"/>
+                </a:solidFill>
+              </a:rPr>
+              <a:t>TICK </a:t>
+            </a:r>
+            <a:r>
+              <a:rPr lang="en-GB" dirty="0">
+                <a:solidFill>
+                  <a:srgbClr val="00B050"/>
+                </a:solidFill>
+                <a:sym typeface="Wingdings" panose="05000000000000000000" pitchFamily="2" charset="2"/>
+              </a:rPr>
+              <a:t></a:t>
+            </a:r>
+            <a:r>
+              <a:rPr lang="en-GB" dirty="0"/>
+              <a:t> </a:t>
             </a:r>
           </a:p>
           <a:p>
@@ -3489,6 +3534,33 @@
               <a:rPr lang="en-GB" dirty="0"/>
               <a:t> mode settings – round based or endless mode</a:t>
             </a:r>
+          </a:p>
+          <a:p>
+            <a:endParaRPr lang="en-GB" u="sng" dirty="0"/>
+          </a:p>
+          <a:p>
+            <a:r>
+              <a:rPr lang="en-GB" u="sng" dirty="0"/>
+              <a:t>28/01 – Q</a:t>
+            </a:r>
+            <a:r>
+              <a:rPr lang="en-GB" i="0" u="sng" dirty="0">
+                <a:effectLst/>
+              </a:rPr>
+              <a:t>uinary goal:</a:t>
+            </a:r>
+            <a:r>
+              <a:rPr lang="en-GB" i="0" dirty="0">
+                <a:effectLst/>
+              </a:rPr>
+              <a:t> star rating on level select – to do after full page </a:t>
+            </a:r>
+            <a:r>
+              <a:rPr lang="en-GB" i="0" dirty="0" err="1">
+                <a:effectLst/>
+              </a:rPr>
+              <a:t>css</a:t>
+            </a:r>
             <a:endParaRPr lang="en-GB" u="sng" dirty="0"/>
           </a:p>
         </p:txBody>
@@ -3507,7 +3579,7 @@
         </p:nvSpPr>
         <p:spPr>
           <a:xfrm>
-            <a:off x="1239520" y="3429000"/>
+            <a:off x="1239520" y="4436706"/>
             <a:ext cx="10088880" cy="2031325"/>
           </a:xfrm>
           <a:prstGeom prst="rect">
@@ -3596,6 +3668,613 @@
     <p:extLst>
       <p:ext uri="{BB962C8B-B14F-4D97-AF65-F5344CB8AC3E}">
         <p14:creationId xmlns:p14="http://schemas.microsoft.com/office/powerpoint/2010/main" val="1794797250"/>
+      </p:ext>
+    </p:extLst>
+  </p:cSld>
+  <p:clrMapOvr>
+    <a:masterClrMapping/>
+  </p:clrMapOvr>
+</p:sld>
+</file>
+
+<file path=ppt/slides/slide10.xml><?xml version="1.0" encoding="utf-8"?>
+<p:sld xmlns:a="http://schemas.openxmlformats.org/drawingml/2006/main" xmlns:r="http://schemas.openxmlformats.org/officeDocument/2006/relationships" xmlns:p="http://schemas.openxmlformats.org/presentationml/2006/main">
+  <p:cSld>
+    <p:spTree>
+      <p:nvGrpSpPr>
+        <p:cNvPr id="1" name=""/>
+        <p:cNvGrpSpPr/>
+        <p:nvPr/>
+      </p:nvGrpSpPr>
+      <p:grpSpPr>
+        <a:xfrm>
+          <a:off x="0" y="0"/>
+          <a:ext cx="0" cy="0"/>
+          <a:chOff x="0" y="0"/>
+          <a:chExt cx="0" cy="0"/>
+        </a:xfrm>
+      </p:grpSpPr>
+      <p:sp>
+        <p:nvSpPr>
+          <p:cNvPr id="3" name="TextBox 2">
+            <a:extLst>
+              <a:ext uri="{FF2B5EF4-FFF2-40B4-BE49-F238E27FC236}">
+                <a16:creationId xmlns:a16="http://schemas.microsoft.com/office/drawing/2014/main" id="{E7D6EA80-0D7B-5F07-02FB-3BDD9A9730E3}"/>
+              </a:ext>
+            </a:extLst>
+          </p:cNvPr>
+          <p:cNvSpPr txBox="1"/>
+          <p:nvPr/>
+        </p:nvSpPr>
+        <p:spPr>
+          <a:xfrm>
+            <a:off x="753446" y="2473700"/>
+            <a:ext cx="6097554" cy="3970318"/>
+          </a:xfrm>
+          <a:prstGeom prst="rect">
+            <a:avLst/>
+          </a:prstGeom>
+          <a:noFill/>
+        </p:spPr>
+        <p:txBody>
+          <a:bodyPr wrap="square">
+            <a:spAutoFit/>
+          </a:bodyPr>
+          <a:lstStyle/>
+          <a:p>
+            <a:r>
+              <a:rPr lang="en-GB" sz="1400" dirty="0"/>
+              <a:t>&lt;script&gt;</a:t>
+            </a:r>
+          </a:p>
+          <a:p>
+            <a:r>
+              <a:rPr lang="en-GB" sz="1400" dirty="0"/>
+              <a:t>var id = null;</a:t>
+            </a:r>
+          </a:p>
+          <a:p>
+            <a:r>
+              <a:rPr lang="en-GB" sz="1400" dirty="0"/>
+              <a:t>function </a:t>
+            </a:r>
+            <a:r>
+              <a:rPr lang="en-GB" sz="1400" dirty="0" err="1"/>
+              <a:t>myMove</a:t>
+            </a:r>
+            <a:r>
+              <a:rPr lang="en-GB" sz="1400" dirty="0"/>
+              <a:t>() {</a:t>
+            </a:r>
+          </a:p>
+          <a:p>
+            <a:r>
+              <a:rPr lang="en-GB" sz="1400" dirty="0"/>
+              <a:t>  var </a:t>
+            </a:r>
+            <a:r>
+              <a:rPr lang="en-GB" sz="1400" dirty="0" err="1"/>
+              <a:t>elem</a:t>
+            </a:r>
+            <a:r>
+              <a:rPr lang="en-GB" sz="1400" dirty="0"/>
+              <a:t> = </a:t>
+            </a:r>
+            <a:r>
+              <a:rPr lang="en-GB" sz="1400" dirty="0" err="1"/>
+              <a:t>document.getElementById</a:t>
+            </a:r>
+            <a:r>
+              <a:rPr lang="en-GB" sz="1400" dirty="0"/>
+              <a:t>("</a:t>
+            </a:r>
+            <a:r>
+              <a:rPr lang="en-GB" sz="1400" dirty="0" err="1"/>
+              <a:t>myAnimation</a:t>
+            </a:r>
+            <a:r>
+              <a:rPr lang="en-GB" sz="1400" dirty="0"/>
+              <a:t>");   </a:t>
+            </a:r>
+          </a:p>
+          <a:p>
+            <a:r>
+              <a:rPr lang="en-GB" sz="1400" dirty="0"/>
+              <a:t>  var </a:t>
+            </a:r>
+            <a:r>
+              <a:rPr lang="en-GB" sz="1400" dirty="0" err="1"/>
+              <a:t>pos</a:t>
+            </a:r>
+            <a:r>
+              <a:rPr lang="en-GB" sz="1400" dirty="0"/>
+              <a:t> = 0;</a:t>
+            </a:r>
+          </a:p>
+          <a:p>
+            <a:r>
+              <a:rPr lang="en-GB" sz="1400" dirty="0"/>
+              <a:t>  </a:t>
+            </a:r>
+            <a:r>
+              <a:rPr lang="en-GB" sz="1400" dirty="0" err="1"/>
+              <a:t>clearInterval</a:t>
+            </a:r>
+            <a:r>
+              <a:rPr lang="en-GB" sz="1400" dirty="0"/>
+              <a:t>(id);</a:t>
+            </a:r>
+          </a:p>
+          <a:p>
+            <a:r>
+              <a:rPr lang="en-GB" sz="1400" dirty="0"/>
+              <a:t>  id = </a:t>
+            </a:r>
+            <a:r>
+              <a:rPr lang="en-GB" sz="1400" dirty="0" err="1"/>
+              <a:t>setInterval</a:t>
+            </a:r>
+            <a:r>
+              <a:rPr lang="en-GB" sz="1400" dirty="0"/>
+              <a:t>(frame, 10);</a:t>
+            </a:r>
+          </a:p>
+          <a:p>
+            <a:r>
+              <a:rPr lang="en-GB" sz="1400" dirty="0"/>
+              <a:t>  function frame() {</a:t>
+            </a:r>
+          </a:p>
+          <a:p>
+            <a:r>
+              <a:rPr lang="en-GB" sz="1400" dirty="0"/>
+              <a:t>    if (</a:t>
+            </a:r>
+            <a:r>
+              <a:rPr lang="en-GB" sz="1400" dirty="0" err="1"/>
+              <a:t>pos</a:t>
+            </a:r>
+            <a:r>
+              <a:rPr lang="en-GB" sz="1400" dirty="0"/>
+              <a:t> == 350) {</a:t>
+            </a:r>
+          </a:p>
+          <a:p>
+            <a:r>
+              <a:rPr lang="en-GB" sz="1400" dirty="0"/>
+              <a:t>      </a:t>
+            </a:r>
+            <a:r>
+              <a:rPr lang="en-GB" sz="1400" dirty="0" err="1"/>
+              <a:t>clearInterval</a:t>
+            </a:r>
+            <a:r>
+              <a:rPr lang="en-GB" sz="1400" dirty="0"/>
+              <a:t>(id);</a:t>
+            </a:r>
+          </a:p>
+          <a:p>
+            <a:r>
+              <a:rPr lang="en-GB" sz="1400" dirty="0"/>
+              <a:t>    } else {</a:t>
+            </a:r>
+          </a:p>
+          <a:p>
+            <a:r>
+              <a:rPr lang="en-GB" sz="1400" dirty="0"/>
+              <a:t>      </a:t>
+            </a:r>
+            <a:r>
+              <a:rPr lang="en-GB" sz="1400" dirty="0" err="1"/>
+              <a:t>pos</a:t>
+            </a:r>
+            <a:r>
+              <a:rPr lang="en-GB" sz="1400" dirty="0"/>
+              <a:t>++; </a:t>
+            </a:r>
+          </a:p>
+          <a:p>
+            <a:r>
+              <a:rPr lang="en-GB" sz="1400" dirty="0"/>
+              <a:t>      </a:t>
+            </a:r>
+            <a:r>
+              <a:rPr lang="en-GB" sz="1400" dirty="0" err="1"/>
+              <a:t>elem.style.top</a:t>
+            </a:r>
+            <a:r>
+              <a:rPr lang="en-GB" sz="1400" dirty="0"/>
+              <a:t> = </a:t>
+            </a:r>
+            <a:r>
+              <a:rPr lang="en-GB" sz="1400" dirty="0" err="1"/>
+              <a:t>pos</a:t>
+            </a:r>
+            <a:r>
+              <a:rPr lang="en-GB" sz="1400" dirty="0"/>
+              <a:t> + '</a:t>
+            </a:r>
+            <a:r>
+              <a:rPr lang="en-GB" sz="1400" dirty="0" err="1"/>
+              <a:t>px</a:t>
+            </a:r>
+            <a:r>
+              <a:rPr lang="en-GB" sz="1400" dirty="0"/>
+              <a:t>'; </a:t>
+            </a:r>
+          </a:p>
+          <a:p>
+            <a:r>
+              <a:rPr lang="en-GB" sz="1400" dirty="0"/>
+              <a:t>      </a:t>
+            </a:r>
+            <a:r>
+              <a:rPr lang="en-GB" sz="1400" dirty="0" err="1"/>
+              <a:t>elem.style.left</a:t>
+            </a:r>
+            <a:r>
+              <a:rPr lang="en-GB" sz="1400" dirty="0"/>
+              <a:t> = </a:t>
+            </a:r>
+            <a:r>
+              <a:rPr lang="en-GB" sz="1400" dirty="0" err="1"/>
+              <a:t>pos</a:t>
+            </a:r>
+            <a:r>
+              <a:rPr lang="en-GB" sz="1400" dirty="0"/>
+              <a:t> + '</a:t>
+            </a:r>
+            <a:r>
+              <a:rPr lang="en-GB" sz="1400" dirty="0" err="1"/>
+              <a:t>px</a:t>
+            </a:r>
+            <a:r>
+              <a:rPr lang="en-GB" sz="1400" dirty="0"/>
+              <a:t>'; </a:t>
+            </a:r>
+          </a:p>
+          <a:p>
+            <a:r>
+              <a:rPr lang="en-GB" sz="1400" dirty="0"/>
+              <a:t>    }</a:t>
+            </a:r>
+          </a:p>
+          <a:p>
+            <a:r>
+              <a:rPr lang="en-GB" sz="1400" dirty="0"/>
+              <a:t>  }</a:t>
+            </a:r>
+          </a:p>
+          <a:p>
+            <a:r>
+              <a:rPr lang="en-GB" sz="1400" dirty="0"/>
+              <a:t>}</a:t>
+            </a:r>
+          </a:p>
+          <a:p>
+            <a:r>
+              <a:rPr lang="en-GB" sz="1400" dirty="0"/>
+              <a:t>&lt;/script&gt;</a:t>
+            </a:r>
+          </a:p>
+        </p:txBody>
+      </p:sp>
+      <p:sp>
+        <p:nvSpPr>
+          <p:cNvPr id="4" name="TextBox 3">
+            <a:extLst>
+              <a:ext uri="{FF2B5EF4-FFF2-40B4-BE49-F238E27FC236}">
+                <a16:creationId xmlns:a16="http://schemas.microsoft.com/office/drawing/2014/main" id="{C3E06DF5-E740-CCA0-CA54-62C8844F3D9A}"/>
+              </a:ext>
+            </a:extLst>
+          </p:cNvPr>
+          <p:cNvSpPr txBox="1"/>
+          <p:nvPr/>
+        </p:nvSpPr>
+        <p:spPr>
+          <a:xfrm>
+            <a:off x="531844" y="1166271"/>
+            <a:ext cx="7772400" cy="1169551"/>
+          </a:xfrm>
+          <a:prstGeom prst="rect">
+            <a:avLst/>
+          </a:prstGeom>
+          <a:noFill/>
+        </p:spPr>
+        <p:txBody>
+          <a:bodyPr wrap="square" rtlCol="0">
+            <a:spAutoFit/>
+          </a:bodyPr>
+          <a:lstStyle/>
+          <a:p>
+            <a:r>
+              <a:rPr lang="en-GB" sz="1400" dirty="0"/>
+              <a:t>Using some relation equations between width of box, speed of animation, and translation angle of a goose I will have a moving goose mode available with 10 levels of moving targets originating from an array of positions on the screen. Initially the bottom, with prospect of movement from the sides.</a:t>
+            </a:r>
+          </a:p>
+          <a:p>
+            <a:endParaRPr lang="en-GB" sz="1400" dirty="0"/>
+          </a:p>
+          <a:p>
+            <a:r>
+              <a:rPr lang="en-GB" sz="1400" dirty="0"/>
+              <a:t>W3 school code using set interval to be utilised and improved for varying vectors. </a:t>
+            </a:r>
+          </a:p>
+        </p:txBody>
+      </p:sp>
+      <p:sp>
+        <p:nvSpPr>
+          <p:cNvPr id="6" name="TextBox 5">
+            <a:extLst>
+              <a:ext uri="{FF2B5EF4-FFF2-40B4-BE49-F238E27FC236}">
+                <a16:creationId xmlns:a16="http://schemas.microsoft.com/office/drawing/2014/main" id="{FAE6120B-AAF6-753B-0DB7-35C8256B970F}"/>
+              </a:ext>
+            </a:extLst>
+          </p:cNvPr>
+          <p:cNvSpPr txBox="1"/>
+          <p:nvPr/>
+        </p:nvSpPr>
+        <p:spPr>
+          <a:xfrm>
+            <a:off x="426874" y="413982"/>
+            <a:ext cx="6097554" cy="523220"/>
+          </a:xfrm>
+          <a:prstGeom prst="rect">
+            <a:avLst/>
+          </a:prstGeom>
+          <a:noFill/>
+        </p:spPr>
+        <p:txBody>
+          <a:bodyPr wrap="square">
+            <a:spAutoFit/>
+          </a:bodyPr>
+          <a:lstStyle/>
+          <a:p>
+            <a:r>
+              <a:rPr lang="en-GB" sz="2800" b="1" u="sng" dirty="0"/>
+              <a:t>Tertiary goal:</a:t>
+            </a:r>
+            <a:r>
+              <a:rPr lang="en-GB" sz="2800" b="1" dirty="0"/>
+              <a:t> Introduce moving targets</a:t>
+            </a:r>
+          </a:p>
+        </p:txBody>
+      </p:sp>
+      <p:cxnSp>
+        <p:nvCxnSpPr>
+          <p:cNvPr id="8" name="Straight Arrow Connector 7">
+            <a:extLst>
+              <a:ext uri="{FF2B5EF4-FFF2-40B4-BE49-F238E27FC236}">
+                <a16:creationId xmlns:a16="http://schemas.microsoft.com/office/drawing/2014/main" id="{4D3634E5-2524-0DA2-26F0-53B6A4B6881C}"/>
+              </a:ext>
+            </a:extLst>
+          </p:cNvPr>
+          <p:cNvCxnSpPr>
+            <a:stCxn id="4" idx="2"/>
+          </p:cNvCxnSpPr>
+          <p:nvPr/>
+        </p:nvCxnSpPr>
+        <p:spPr>
+          <a:xfrm flipH="1">
+            <a:off x="3802223" y="2335822"/>
+            <a:ext cx="615821" cy="454031"/>
+          </a:xfrm>
+          <a:prstGeom prst="straightConnector1">
+            <a:avLst/>
+          </a:prstGeom>
+          <a:ln>
+            <a:tailEnd type="triangle"/>
+          </a:ln>
+        </p:spPr>
+        <p:style>
+          <a:lnRef idx="3">
+            <a:schemeClr val="dk1"/>
+          </a:lnRef>
+          <a:fillRef idx="0">
+            <a:schemeClr val="dk1"/>
+          </a:fillRef>
+          <a:effectRef idx="2">
+            <a:schemeClr val="dk1"/>
+          </a:effectRef>
+          <a:fontRef idx="minor">
+            <a:schemeClr val="tx1"/>
+          </a:fontRef>
+        </p:style>
+      </p:cxnSp>
+    </p:spTree>
+    <p:extLst>
+      <p:ext uri="{BB962C8B-B14F-4D97-AF65-F5344CB8AC3E}">
+        <p14:creationId xmlns:p14="http://schemas.microsoft.com/office/powerpoint/2010/main" val="2277867630"/>
+      </p:ext>
+    </p:extLst>
+  </p:cSld>
+  <p:clrMapOvr>
+    <a:masterClrMapping/>
+  </p:clrMapOvr>
+</p:sld>
+</file>
+
+<file path=ppt/slides/slide11.xml><?xml version="1.0" encoding="utf-8"?>
+<p:sld xmlns:a="http://schemas.openxmlformats.org/drawingml/2006/main" xmlns:r="http://schemas.openxmlformats.org/officeDocument/2006/relationships" xmlns:p="http://schemas.openxmlformats.org/presentationml/2006/main">
+  <p:cSld>
+    <p:spTree>
+      <p:nvGrpSpPr>
+        <p:cNvPr id="1" name=""/>
+        <p:cNvGrpSpPr/>
+        <p:nvPr/>
+      </p:nvGrpSpPr>
+      <p:grpSpPr>
+        <a:xfrm>
+          <a:off x="0" y="0"/>
+          <a:ext cx="0" cy="0"/>
+          <a:chOff x="0" y="0"/>
+          <a:chExt cx="0" cy="0"/>
+        </a:xfrm>
+      </p:grpSpPr>
+      <p:sp>
+        <p:nvSpPr>
+          <p:cNvPr id="2" name="TextBox 1">
+            <a:extLst>
+              <a:ext uri="{FF2B5EF4-FFF2-40B4-BE49-F238E27FC236}">
+                <a16:creationId xmlns:a16="http://schemas.microsoft.com/office/drawing/2014/main" id="{52E5B912-AB0F-3AA4-7700-FF3162924B66}"/>
+              </a:ext>
+            </a:extLst>
+          </p:cNvPr>
+          <p:cNvSpPr txBox="1"/>
+          <p:nvPr/>
+        </p:nvSpPr>
+        <p:spPr>
+          <a:xfrm>
+            <a:off x="548640" y="609600"/>
+            <a:ext cx="6066764" cy="1754326"/>
+          </a:xfrm>
+          <a:prstGeom prst="rect">
+            <a:avLst/>
+          </a:prstGeom>
+          <a:noFill/>
+        </p:spPr>
+        <p:txBody>
+          <a:bodyPr wrap="square" rtlCol="0">
+            <a:spAutoFit/>
+          </a:bodyPr>
+          <a:lstStyle/>
+          <a:p>
+            <a:r>
+              <a:rPr lang="en-GB" dirty="0"/>
+              <a:t>Easter (goose) eggs:</a:t>
+            </a:r>
+          </a:p>
+          <a:p>
+            <a:pPr marL="285750" indent="-285750">
+              <a:buFont typeface="Arial" panose="020B0604020202020204" pitchFamily="34" charset="0"/>
+              <a:buChar char="•"/>
+            </a:pPr>
+            <a:r>
+              <a:rPr lang="en-GB" dirty="0"/>
+              <a:t>Game rewards completion with </a:t>
+            </a:r>
+            <a:r>
+              <a:rPr lang="en-GB" b="0" i="0" dirty="0">
+                <a:solidFill>
+                  <a:srgbClr val="000000"/>
+                </a:solidFill>
+                <a:effectLst/>
+                <a:latin typeface="Linux Libertine"/>
+              </a:rPr>
+              <a:t>Foie gras – feeding the goose the whole time is true but the reason is hidden</a:t>
+            </a:r>
+          </a:p>
+          <a:p>
+            <a:pPr marL="285750" indent="-285750">
+              <a:buFont typeface="Arial" panose="020B0604020202020204" pitchFamily="34" charset="0"/>
+              <a:buChar char="•"/>
+            </a:pPr>
+            <a:r>
+              <a:rPr lang="en-GB" dirty="0">
+                <a:solidFill>
+                  <a:srgbClr val="000000"/>
+                </a:solidFill>
+                <a:latin typeface="Linux Libertine"/>
+              </a:rPr>
+              <a:t>Loss at any point rewards only seeds too fatten the feeder up.</a:t>
+            </a:r>
+          </a:p>
+          <a:p>
+            <a:pPr marL="285750" indent="-285750">
+              <a:buFont typeface="Arial" panose="020B0604020202020204" pitchFamily="34" charset="0"/>
+              <a:buChar char="•"/>
+            </a:pPr>
+            <a:r>
+              <a:rPr lang="en-GB" dirty="0">
+                <a:solidFill>
+                  <a:srgbClr val="000000"/>
+                </a:solidFill>
+                <a:latin typeface="Linux Libertine"/>
+              </a:rPr>
+              <a:t>After Foie gras is awarded endless mode is activated.</a:t>
+            </a:r>
+            <a:r>
+              <a:rPr lang="en-GB" dirty="0"/>
+              <a:t> </a:t>
+            </a:r>
+          </a:p>
+        </p:txBody>
+      </p:sp>
+      <p:sp>
+        <p:nvSpPr>
+          <p:cNvPr id="3" name="Rectangle 2">
+            <a:extLst>
+              <a:ext uri="{FF2B5EF4-FFF2-40B4-BE49-F238E27FC236}">
+                <a16:creationId xmlns:a16="http://schemas.microsoft.com/office/drawing/2014/main" id="{03B759C1-F6F2-EC01-E0C0-D549147D5D3D}"/>
+              </a:ext>
+            </a:extLst>
+          </p:cNvPr>
+          <p:cNvSpPr/>
+          <p:nvPr/>
+        </p:nvSpPr>
+        <p:spPr>
+          <a:xfrm>
+            <a:off x="334034" y="450443"/>
+            <a:ext cx="7112000" cy="2072640"/>
+          </a:xfrm>
+          <a:prstGeom prst="rect">
+            <a:avLst/>
+          </a:prstGeom>
+        </p:spPr>
+        <p:style>
+          <a:lnRef idx="2">
+            <a:schemeClr val="dk1">
+              <a:shade val="50000"/>
+            </a:schemeClr>
+          </a:lnRef>
+          <a:fillRef idx="1">
+            <a:schemeClr val="dk1"/>
+          </a:fillRef>
+          <a:effectRef idx="0">
+            <a:schemeClr val="dk1"/>
+          </a:effectRef>
+          <a:fontRef idx="minor">
+            <a:schemeClr val="lt1"/>
+          </a:fontRef>
+        </p:style>
+        <p:txBody>
+          <a:bodyPr rtlCol="0" anchor="ctr"/>
+          <a:lstStyle/>
+          <a:p>
+            <a:pPr algn="ctr"/>
+            <a:r>
+              <a:rPr lang="en-GB" sz="9600" u="sng" dirty="0">
+                <a:solidFill>
+                  <a:srgbClr val="FFC000"/>
+                </a:solidFill>
+              </a:rPr>
+              <a:t>Lore</a:t>
+            </a:r>
+            <a:r>
+              <a:rPr lang="en-GB" sz="9600" dirty="0">
+                <a:solidFill>
+                  <a:srgbClr val="FFC000"/>
+                </a:solidFill>
+              </a:rPr>
+              <a:t> </a:t>
+            </a:r>
+            <a:r>
+              <a:rPr lang="en-GB" sz="9600" u="sng" dirty="0">
+                <a:solidFill>
+                  <a:srgbClr val="FFC000"/>
+                </a:solidFill>
+              </a:rPr>
+              <a:t>Spoilers</a:t>
+            </a:r>
+          </a:p>
+        </p:txBody>
+      </p:sp>
+    </p:spTree>
+    <p:extLst>
+      <p:ext uri="{BB962C8B-B14F-4D97-AF65-F5344CB8AC3E}">
+        <p14:creationId xmlns:p14="http://schemas.microsoft.com/office/powerpoint/2010/main" val="1199789277"/>
       </p:ext>
     </p:extLst>
   </p:cSld>
@@ -5291,6 +5970,339 @@
           </a:p>
         </p:txBody>
       </p:sp>
+      <p:sp>
+        <p:nvSpPr>
+          <p:cNvPr id="4" name="TextBox 3">
+            <a:extLst>
+              <a:ext uri="{FF2B5EF4-FFF2-40B4-BE49-F238E27FC236}">
+                <a16:creationId xmlns:a16="http://schemas.microsoft.com/office/drawing/2014/main" id="{0182DE5C-C402-C432-2C38-8C80EB79C9D0}"/>
+              </a:ext>
+            </a:extLst>
+          </p:cNvPr>
+          <p:cNvSpPr txBox="1"/>
+          <p:nvPr/>
+        </p:nvSpPr>
+        <p:spPr>
+          <a:xfrm>
+            <a:off x="3048777" y="1998769"/>
+            <a:ext cx="7821385" cy="4855240"/>
+          </a:xfrm>
+          <a:prstGeom prst="rect">
+            <a:avLst/>
+          </a:prstGeom>
+          <a:noFill/>
+        </p:spPr>
+        <p:txBody>
+          <a:bodyPr wrap="square">
+            <a:spAutoFit/>
+          </a:bodyPr>
+          <a:lstStyle/>
+          <a:p>
+            <a:pPr>
+              <a:lnSpc>
+                <a:spcPct val="107000"/>
+              </a:lnSpc>
+              <a:spcAft>
+                <a:spcPts val="800"/>
+              </a:spcAft>
+            </a:pPr>
+            <a:r>
+              <a:rPr lang="en-GB" sz="1800" dirty="0" err="1">
+                <a:effectLst/>
+                <a:latin typeface="Calibri" panose="020F0502020204030204" pitchFamily="34" charset="0"/>
+                <a:ea typeface="Calibri" panose="020F0502020204030204" pitchFamily="34" charset="0"/>
+                <a:cs typeface="Times New Roman" panose="02020603050405020304" pitchFamily="18" charset="0"/>
+              </a:rPr>
+              <a:t>setinterval</a:t>
+            </a:r>
+            <a:r>
+              <a:rPr lang="en-GB" sz="1800" dirty="0">
+                <a:effectLst/>
+                <a:latin typeface="Calibri" panose="020F0502020204030204" pitchFamily="34" charset="0"/>
+                <a:ea typeface="Calibri" panose="020F0502020204030204" pitchFamily="34" charset="0"/>
+                <a:cs typeface="Times New Roman" panose="02020603050405020304" pitchFamily="18" charset="0"/>
+              </a:rPr>
+              <a:t>(function, time) function will happen every time seconds</a:t>
+            </a:r>
+          </a:p>
+          <a:p>
+            <a:pPr>
+              <a:lnSpc>
+                <a:spcPct val="107000"/>
+              </a:lnSpc>
+              <a:spcAft>
+                <a:spcPts val="800"/>
+              </a:spcAft>
+            </a:pPr>
+            <a:r>
+              <a:rPr lang="en-GB" dirty="0">
+                <a:latin typeface="Calibri" panose="020F0502020204030204" pitchFamily="34" charset="0"/>
+                <a:ea typeface="Calibri" panose="020F0502020204030204" pitchFamily="34" charset="0"/>
+                <a:cs typeface="Times New Roman" panose="02020603050405020304" pitchFamily="18" charset="0"/>
+              </a:rPr>
+              <a:t>Function is defined once and then repeatedly ran. </a:t>
+            </a:r>
+            <a:endParaRPr lang="en-GB" sz="1800" dirty="0">
+              <a:effectLst/>
+              <a:latin typeface="Calibri" panose="020F0502020204030204" pitchFamily="34" charset="0"/>
+              <a:ea typeface="Calibri" panose="020F0502020204030204" pitchFamily="34" charset="0"/>
+              <a:cs typeface="Times New Roman" panose="02020603050405020304" pitchFamily="18" charset="0"/>
+            </a:endParaRPr>
+          </a:p>
+          <a:p>
+            <a:pPr>
+              <a:lnSpc>
+                <a:spcPct val="107000"/>
+              </a:lnSpc>
+              <a:spcAft>
+                <a:spcPts val="800"/>
+              </a:spcAft>
+            </a:pPr>
+            <a:r>
+              <a:rPr lang="en-GB" sz="1800" dirty="0" err="1">
+                <a:effectLst/>
+                <a:latin typeface="Calibri" panose="020F0502020204030204" pitchFamily="34" charset="0"/>
+                <a:ea typeface="Calibri" panose="020F0502020204030204" pitchFamily="34" charset="0"/>
+                <a:cs typeface="Times New Roman" panose="02020603050405020304" pitchFamily="18" charset="0"/>
+              </a:rPr>
+              <a:t>clearinterval</a:t>
+            </a:r>
+            <a:r>
+              <a:rPr lang="en-GB" sz="1800" dirty="0">
+                <a:effectLst/>
+                <a:latin typeface="Calibri" panose="020F0502020204030204" pitchFamily="34" charset="0"/>
+                <a:ea typeface="Calibri" panose="020F0502020204030204" pitchFamily="34" charset="0"/>
+                <a:cs typeface="Times New Roman" panose="02020603050405020304" pitchFamily="18" charset="0"/>
+              </a:rPr>
+              <a:t>(</a:t>
+            </a:r>
+            <a:r>
+              <a:rPr lang="en-GB" sz="1800" dirty="0" err="1">
+                <a:effectLst/>
+                <a:latin typeface="Calibri" panose="020F0502020204030204" pitchFamily="34" charset="0"/>
+                <a:ea typeface="Calibri" panose="020F0502020204030204" pitchFamily="34" charset="0"/>
+                <a:cs typeface="Times New Roman" panose="02020603050405020304" pitchFamily="18" charset="0"/>
+              </a:rPr>
+              <a:t>intervalID</a:t>
+            </a:r>
+            <a:r>
+              <a:rPr lang="en-GB" sz="1800" dirty="0">
+                <a:effectLst/>
+                <a:latin typeface="Calibri" panose="020F0502020204030204" pitchFamily="34" charset="0"/>
+                <a:ea typeface="Calibri" panose="020F0502020204030204" pitchFamily="34" charset="0"/>
+                <a:cs typeface="Times New Roman" panose="02020603050405020304" pitchFamily="18" charset="0"/>
+              </a:rPr>
+              <a:t>)</a:t>
+            </a:r>
+          </a:p>
+          <a:p>
+            <a:pPr>
+              <a:lnSpc>
+                <a:spcPct val="107000"/>
+              </a:lnSpc>
+              <a:spcAft>
+                <a:spcPts val="800"/>
+              </a:spcAft>
+            </a:pPr>
+            <a:r>
+              <a:rPr lang="en-GB" sz="1800" dirty="0">
+                <a:effectLst/>
+                <a:latin typeface="Calibri" panose="020F0502020204030204" pitchFamily="34" charset="0"/>
+                <a:ea typeface="Calibri" panose="020F0502020204030204" pitchFamily="34" charset="0"/>
+                <a:cs typeface="Times New Roman" panose="02020603050405020304" pitchFamily="18" charset="0"/>
+              </a:rPr>
+              <a:t> </a:t>
+            </a:r>
+          </a:p>
+          <a:p>
+            <a:pPr>
+              <a:lnSpc>
+                <a:spcPct val="107000"/>
+              </a:lnSpc>
+              <a:spcAft>
+                <a:spcPts val="800"/>
+              </a:spcAft>
+            </a:pPr>
+            <a:r>
+              <a:rPr lang="en-GB" sz="1800" dirty="0">
+                <a:effectLst/>
+                <a:latin typeface="Calibri" panose="020F0502020204030204" pitchFamily="34" charset="0"/>
+                <a:ea typeface="Calibri" panose="020F0502020204030204" pitchFamily="34" charset="0"/>
+                <a:cs typeface="Times New Roman" panose="02020603050405020304" pitchFamily="18" charset="0"/>
+              </a:rPr>
+              <a:t>write a function that hatches a goose from the array every x seconds then uses </a:t>
+            </a:r>
+            <a:r>
+              <a:rPr lang="en-GB" sz="1800" dirty="0" err="1">
+                <a:effectLst/>
+                <a:latin typeface="Calibri" panose="020F0502020204030204" pitchFamily="34" charset="0"/>
+                <a:ea typeface="Calibri" panose="020F0502020204030204" pitchFamily="34" charset="0"/>
+                <a:cs typeface="Times New Roman" panose="02020603050405020304" pitchFamily="18" charset="0"/>
+              </a:rPr>
+              <a:t>settimeout</a:t>
+            </a:r>
+            <a:r>
+              <a:rPr lang="en-GB" sz="1800" dirty="0">
+                <a:effectLst/>
+                <a:latin typeface="Calibri" panose="020F0502020204030204" pitchFamily="34" charset="0"/>
+                <a:ea typeface="Calibri" panose="020F0502020204030204" pitchFamily="34" charset="0"/>
+                <a:cs typeface="Times New Roman" panose="02020603050405020304" pitchFamily="18" charset="0"/>
+              </a:rPr>
+              <a:t> to clear it from display</a:t>
+            </a:r>
+          </a:p>
+          <a:p>
+            <a:pPr>
+              <a:lnSpc>
+                <a:spcPct val="107000"/>
+              </a:lnSpc>
+              <a:spcAft>
+                <a:spcPts val="800"/>
+              </a:spcAft>
+            </a:pPr>
+            <a:endParaRPr lang="en-GB" dirty="0">
+              <a:latin typeface="Calibri" panose="020F0502020204030204" pitchFamily="34" charset="0"/>
+              <a:ea typeface="Calibri" panose="020F0502020204030204" pitchFamily="34" charset="0"/>
+              <a:cs typeface="Times New Roman" panose="02020603050405020304" pitchFamily="18" charset="0"/>
+            </a:endParaRPr>
+          </a:p>
+          <a:p>
+            <a:pPr>
+              <a:lnSpc>
+                <a:spcPct val="107000"/>
+              </a:lnSpc>
+              <a:spcAft>
+                <a:spcPts val="800"/>
+              </a:spcAft>
+            </a:pPr>
+            <a:endParaRPr lang="en-GB" sz="1800" dirty="0">
+              <a:effectLst/>
+              <a:latin typeface="Calibri" panose="020F0502020204030204" pitchFamily="34" charset="0"/>
+              <a:ea typeface="Calibri" panose="020F0502020204030204" pitchFamily="34" charset="0"/>
+              <a:cs typeface="Times New Roman" panose="02020603050405020304" pitchFamily="18" charset="0"/>
+            </a:endParaRPr>
+          </a:p>
+          <a:p>
+            <a:pPr>
+              <a:lnSpc>
+                <a:spcPct val="107000"/>
+              </a:lnSpc>
+              <a:spcAft>
+                <a:spcPts val="800"/>
+              </a:spcAft>
+            </a:pPr>
+            <a:r>
+              <a:rPr lang="en-GB" sz="1800" dirty="0">
+                <a:effectLst/>
+                <a:latin typeface="Calibri" panose="020F0502020204030204" pitchFamily="34" charset="0"/>
+                <a:ea typeface="Calibri" panose="020F0502020204030204" pitchFamily="34" charset="0"/>
+                <a:cs typeface="Times New Roman" panose="02020603050405020304" pitchFamily="18" charset="0"/>
+              </a:rPr>
+              <a:t>Set timeout(function, time) function will happen after given time</a:t>
+            </a:r>
+          </a:p>
+          <a:p>
+            <a:pPr>
+              <a:lnSpc>
+                <a:spcPct val="107000"/>
+              </a:lnSpc>
+              <a:spcAft>
+                <a:spcPts val="800"/>
+              </a:spcAft>
+            </a:pPr>
+            <a:endParaRPr lang="en-GB" dirty="0">
+              <a:latin typeface="Calibri" panose="020F0502020204030204" pitchFamily="34" charset="0"/>
+              <a:ea typeface="Calibri" panose="020F0502020204030204" pitchFamily="34" charset="0"/>
+              <a:cs typeface="Times New Roman" panose="02020603050405020304" pitchFamily="18" charset="0"/>
+            </a:endParaRPr>
+          </a:p>
+          <a:p>
+            <a:pPr>
+              <a:lnSpc>
+                <a:spcPct val="107000"/>
+              </a:lnSpc>
+              <a:spcAft>
+                <a:spcPts val="800"/>
+              </a:spcAft>
+            </a:pPr>
+            <a:r>
+              <a:rPr lang="en-GB" dirty="0">
+                <a:solidFill>
+                  <a:srgbClr val="FF0000"/>
+                </a:solidFill>
+                <a:latin typeface="Calibri" panose="020F0502020204030204" pitchFamily="34" charset="0"/>
+                <a:ea typeface="Calibri" panose="020F0502020204030204" pitchFamily="34" charset="0"/>
+                <a:cs typeface="Times New Roman" panose="02020603050405020304" pitchFamily="18" charset="0"/>
+              </a:rPr>
+              <a:t>Had problem with declaring the function as it can only be called as </a:t>
+            </a:r>
+            <a:r>
+              <a:rPr lang="en-GB" i="1" dirty="0">
+                <a:solidFill>
+                  <a:srgbClr val="FF0000"/>
+                </a:solidFill>
+                <a:latin typeface="Calibri" panose="020F0502020204030204" pitchFamily="34" charset="0"/>
+                <a:ea typeface="Calibri" panose="020F0502020204030204" pitchFamily="34" charset="0"/>
+                <a:cs typeface="Times New Roman" panose="02020603050405020304" pitchFamily="18" charset="0"/>
+              </a:rPr>
+              <a:t>function </a:t>
+            </a:r>
+            <a:r>
+              <a:rPr lang="en-GB" dirty="0">
+                <a:solidFill>
+                  <a:srgbClr val="FF0000"/>
+                </a:solidFill>
+                <a:latin typeface="Calibri" panose="020F0502020204030204" pitchFamily="34" charset="0"/>
+                <a:ea typeface="Calibri" panose="020F0502020204030204" pitchFamily="34" charset="0"/>
+                <a:cs typeface="Times New Roman" panose="02020603050405020304" pitchFamily="18" charset="0"/>
+              </a:rPr>
+              <a:t> not </a:t>
+            </a:r>
+            <a:r>
+              <a:rPr lang="en-GB" i="1" dirty="0">
+                <a:solidFill>
+                  <a:srgbClr val="FF0000"/>
+                </a:solidFill>
+                <a:latin typeface="Calibri" panose="020F0502020204030204" pitchFamily="34" charset="0"/>
+                <a:ea typeface="Calibri" panose="020F0502020204030204" pitchFamily="34" charset="0"/>
+                <a:cs typeface="Times New Roman" panose="02020603050405020304" pitchFamily="18" charset="0"/>
+              </a:rPr>
+              <a:t>function()</a:t>
+            </a:r>
+            <a:r>
+              <a:rPr lang="en-GB" dirty="0">
+                <a:solidFill>
+                  <a:srgbClr val="FF0000"/>
+                </a:solidFill>
+                <a:latin typeface="Calibri" panose="020F0502020204030204" pitchFamily="34" charset="0"/>
+                <a:ea typeface="Calibri" panose="020F0502020204030204" pitchFamily="34" charset="0"/>
+                <a:cs typeface="Times New Roman" panose="02020603050405020304" pitchFamily="18" charset="0"/>
+              </a:rPr>
+              <a:t>. </a:t>
+            </a:r>
+            <a:r>
+              <a:rPr lang="en-GB" dirty="0">
+                <a:solidFill>
+                  <a:srgbClr val="00B050"/>
+                </a:solidFill>
+                <a:latin typeface="Calibri" panose="020F0502020204030204" pitchFamily="34" charset="0"/>
+                <a:ea typeface="Calibri" panose="020F0502020204030204" pitchFamily="34" charset="0"/>
+                <a:cs typeface="Times New Roman" panose="02020603050405020304" pitchFamily="18" charset="0"/>
+              </a:rPr>
+              <a:t>Fixed this issue and code works and rounds can be run with press of a button. Game can be reset with reload()</a:t>
+            </a:r>
+            <a:endParaRPr lang="en-GB" sz="1800" dirty="0">
+              <a:solidFill>
+                <a:srgbClr val="FF0000"/>
+              </a:solidFill>
+              <a:effectLst/>
+              <a:latin typeface="Calibri" panose="020F0502020204030204" pitchFamily="34" charset="0"/>
+              <a:ea typeface="Calibri" panose="020F0502020204030204" pitchFamily="34" charset="0"/>
+              <a:cs typeface="Times New Roman" panose="02020603050405020304" pitchFamily="18" charset="0"/>
+            </a:endParaRPr>
+          </a:p>
+        </p:txBody>
+      </p:sp>
     </p:spTree>
     <p:extLst>
       <p:ext uri="{BB962C8B-B14F-4D97-AF65-F5344CB8AC3E}">
@@ -5456,7 +6468,7 @@
           <p:cNvPr id="2" name="TextBox 1">
             <a:extLst>
               <a:ext uri="{FF2B5EF4-FFF2-40B4-BE49-F238E27FC236}">
-                <a16:creationId xmlns:a16="http://schemas.microsoft.com/office/drawing/2014/main" id="{52E5B912-AB0F-3AA4-7700-FF3162924B66}"/>
+                <a16:creationId xmlns:a16="http://schemas.microsoft.com/office/drawing/2014/main" id="{1C33381F-460D-8B29-3466-522BEBD068BC}"/>
               </a:ext>
             </a:extLst>
           </p:cNvPr>
@@ -5465,8 +6477,8 @@
         </p:nvSpPr>
         <p:spPr>
           <a:xfrm>
-            <a:off x="548640" y="609600"/>
-            <a:ext cx="6066764" cy="1754326"/>
+            <a:off x="681135" y="513184"/>
+            <a:ext cx="11383347" cy="5909310"/>
           </a:xfrm>
           <a:prstGeom prst="rect">
             <a:avLst/>
@@ -5481,138 +6493,349 @@
           <a:p>
             <a:r>
               <a:rPr lang="en-GB" dirty="0"/>
-              <a:t>Easter (goose) eggs:</a:t>
-            </a:r>
-          </a:p>
-          <a:p>
-            <a:pPr marL="285750" indent="-285750">
-              <a:buFont typeface="Arial" panose="020B0604020202020204" pitchFamily="34" charset="0"/>
-              <a:buChar char="•"/>
-            </a:pPr>
-            <a:r>
-              <a:rPr lang="en-GB" dirty="0"/>
-              <a:t>Game rewards completion with </a:t>
-            </a:r>
-            <a:r>
-              <a:rPr lang="en-GB" b="0" i="0" dirty="0">
-                <a:solidFill>
-                  <a:srgbClr val="000000"/>
-                </a:solidFill>
-                <a:effectLst/>
-                <a:latin typeface="Linux Libertine"/>
-              </a:rPr>
-              <a:t>Foie gras – feeding the goose the whole time is true but the reason is hidden</a:t>
-            </a:r>
-          </a:p>
-          <a:p>
-            <a:pPr marL="285750" indent="-285750">
-              <a:buFont typeface="Arial" panose="020B0604020202020204" pitchFamily="34" charset="0"/>
-              <a:buChar char="•"/>
-            </a:pPr>
-            <a:r>
-              <a:rPr lang="en-GB" dirty="0">
-                <a:solidFill>
-                  <a:srgbClr val="000000"/>
-                </a:solidFill>
-                <a:latin typeface="Linux Libertine"/>
-              </a:rPr>
-              <a:t>Loss at any point rewards only seeds too fatten the feeder up.</a:t>
-            </a:r>
-          </a:p>
-          <a:p>
-            <a:pPr marL="285750" indent="-285750">
-              <a:buFont typeface="Arial" panose="020B0604020202020204" pitchFamily="34" charset="0"/>
-              <a:buChar char="•"/>
-            </a:pPr>
-            <a:r>
-              <a:rPr lang="en-GB" dirty="0">
-                <a:solidFill>
-                  <a:srgbClr val="000000"/>
-                </a:solidFill>
-                <a:latin typeface="Linux Libertine"/>
-              </a:rPr>
-              <a:t>After Foie gras is awarded endless mode is activated.</a:t>
-            </a:r>
-            <a:r>
-              <a:rPr lang="en-GB" dirty="0"/>
-              <a:t> </a:t>
-            </a:r>
-          </a:p>
-        </p:txBody>
-      </p:sp>
-      <p:sp>
-        <p:nvSpPr>
-          <p:cNvPr id="3" name="Rectangle 2">
-            <a:extLst>
-              <a:ext uri="{FF2B5EF4-FFF2-40B4-BE49-F238E27FC236}">
-                <a16:creationId xmlns:a16="http://schemas.microsoft.com/office/drawing/2014/main" id="{03B759C1-F6F2-EC01-E0C0-D549147D5D3D}"/>
-              </a:ext>
-            </a:extLst>
-          </p:cNvPr>
-          <p:cNvSpPr/>
+              <a:t>28/01 completion of main JS goal! </a:t>
+            </a:r>
+          </a:p>
+          <a:p>
+            <a:r>
+              <a:rPr lang="en-GB" dirty="0"/>
+              <a:t>CSS needs to be tidied up but aesthetics aren’t a priority until tertiary JS goal is complete</a:t>
+            </a:r>
+          </a:p>
+          <a:p>
+            <a:endParaRPr lang="en-GB" dirty="0"/>
+          </a:p>
+          <a:p>
+            <a:r>
+              <a:rPr lang="en-GB" dirty="0"/>
+              <a:t>Introduction of rounds will be introduced using a while condition or an if condition and round load will be made into a function that runs for each condition.</a:t>
+            </a:r>
+          </a:p>
+          <a:p>
+            <a:r>
+              <a:rPr lang="en-GB" i="1" dirty="0"/>
+              <a:t>For round=0, round&lt;10, round ++</a:t>
+            </a:r>
+          </a:p>
+          <a:p>
+            <a:r>
+              <a:rPr lang="en-GB" i="1" dirty="0"/>
+              <a:t>When round = 0 </a:t>
+            </a:r>
+            <a:r>
+              <a:rPr lang="en-GB" i="1" dirty="0" err="1"/>
+              <a:t>consts</a:t>
+            </a:r>
+            <a:r>
+              <a:rPr lang="en-GB" i="1" dirty="0"/>
+              <a:t> = </a:t>
+            </a:r>
+            <a:r>
+              <a:rPr lang="en-GB" i="1" dirty="0" err="1"/>
+              <a:t>consts</a:t>
+            </a:r>
+            <a:endParaRPr lang="en-GB" i="1" dirty="0"/>
+          </a:p>
+          <a:p>
+            <a:r>
+              <a:rPr lang="en-GB" b="1" dirty="0"/>
+              <a:t>if (</a:t>
+            </a:r>
+            <a:r>
+              <a:rPr lang="en-GB" b="1" dirty="0" err="1"/>
+              <a:t>lostGeese</a:t>
+            </a:r>
+            <a:r>
+              <a:rPr lang="en-GB" b="1" dirty="0"/>
+              <a:t> &lt; number of geese in round 0 )</a:t>
+            </a:r>
+          </a:p>
+          <a:p>
+            <a:r>
+              <a:rPr lang="en-GB" b="1" dirty="0"/>
+              <a:t>Run round[0] </a:t>
+            </a:r>
+          </a:p>
+          <a:p>
+            <a:endParaRPr lang="en-GB" b="1" dirty="0"/>
+          </a:p>
+          <a:p>
+            <a:r>
+              <a:rPr lang="en-GB" b="1" dirty="0"/>
+              <a:t>Else if (</a:t>
+            </a:r>
+            <a:r>
+              <a:rPr lang="en-GB" b="1" dirty="0" err="1"/>
+              <a:t>lostGeese</a:t>
+            </a:r>
+            <a:r>
+              <a:rPr lang="en-GB" b="1" dirty="0"/>
+              <a:t> &lt; number of geese in round 1</a:t>
+            </a:r>
+          </a:p>
+          <a:p>
+            <a:r>
+              <a:rPr lang="en-GB" b="1" dirty="0"/>
+              <a:t>Can use switch case</a:t>
+            </a:r>
+          </a:p>
+          <a:p>
+            <a:endParaRPr lang="en-GB" b="1" dirty="0"/>
+          </a:p>
+          <a:p>
+            <a:r>
+              <a:rPr lang="en-GB" b="1" dirty="0"/>
+              <a:t>Can have rounds or level select??? Level select is easier for me to code </a:t>
+            </a:r>
+            <a:r>
+              <a:rPr lang="en-GB" b="1" dirty="0" err="1"/>
+              <a:t>rn</a:t>
+            </a:r>
+            <a:r>
+              <a:rPr lang="en-GB" b="1" dirty="0"/>
+              <a:t>. </a:t>
+            </a:r>
+          </a:p>
+          <a:p>
+            <a:r>
+              <a:rPr lang="en-GB" b="1" dirty="0"/>
+              <a:t>Level select: level available to click when condition met in a round</a:t>
+            </a:r>
+          </a:p>
+          <a:p>
+            <a:r>
+              <a:rPr lang="en-GB" b="1" dirty="0"/>
+              <a:t>Have an option of level select or endless mode.</a:t>
+            </a:r>
+          </a:p>
+          <a:p>
+            <a:endParaRPr lang="en-GB" b="1" dirty="0"/>
+          </a:p>
+          <a:p>
+            <a:r>
+              <a:rPr lang="en-GB" b="1" dirty="0"/>
+              <a:t>Rounds don’t occur anymore, simply select next level and then </a:t>
+            </a:r>
+          </a:p>
+          <a:p>
+            <a:endParaRPr lang="en-GB" b="1" dirty="0"/>
+          </a:p>
+          <a:p>
+            <a:endParaRPr lang="en-GB" dirty="0"/>
+          </a:p>
+          <a:p>
+            <a:endParaRPr lang="en-GB" dirty="0"/>
+          </a:p>
+        </p:txBody>
+      </p:sp>
+    </p:spTree>
+    <p:extLst>
+      <p:ext uri="{BB962C8B-B14F-4D97-AF65-F5344CB8AC3E}">
+        <p14:creationId xmlns:p14="http://schemas.microsoft.com/office/powerpoint/2010/main" val="941900657"/>
+      </p:ext>
+    </p:extLst>
+  </p:cSld>
+  <p:clrMapOvr>
+    <a:masterClrMapping/>
+  </p:clrMapOvr>
+</p:sld>
+</file>
+
+<file path=ppt/slides/slide9.xml><?xml version="1.0" encoding="utf-8"?>
+<p:sld xmlns:a="http://schemas.openxmlformats.org/drawingml/2006/main" xmlns:r="http://schemas.openxmlformats.org/officeDocument/2006/relationships" xmlns:p="http://schemas.openxmlformats.org/presentationml/2006/main">
+  <p:cSld>
+    <p:spTree>
+      <p:nvGrpSpPr>
+        <p:cNvPr id="1" name=""/>
+        <p:cNvGrpSpPr/>
+        <p:nvPr/>
+      </p:nvGrpSpPr>
+      <p:grpSpPr>
+        <a:xfrm>
+          <a:off x="0" y="0"/>
+          <a:ext cx="0" cy="0"/>
+          <a:chOff x="0" y="0"/>
+          <a:chExt cx="0" cy="0"/>
+        </a:xfrm>
+      </p:grpSpPr>
+      <p:sp>
+        <p:nvSpPr>
+          <p:cNvPr id="2" name="TextBox 1">
+            <a:extLst>
+              <a:ext uri="{FF2B5EF4-FFF2-40B4-BE49-F238E27FC236}">
+                <a16:creationId xmlns:a16="http://schemas.microsoft.com/office/drawing/2014/main" id="{7E1ADE3D-B4B6-2760-C431-298AFE27211C}"/>
+              </a:ext>
+            </a:extLst>
+          </p:cNvPr>
+          <p:cNvSpPr txBox="1"/>
           <p:nvPr/>
         </p:nvSpPr>
         <p:spPr>
           <a:xfrm>
-            <a:off x="371357" y="450443"/>
-            <a:ext cx="7112000" cy="2072640"/>
+            <a:off x="653143" y="279918"/>
+            <a:ext cx="10515600" cy="5447645"/>
           </a:xfrm>
           <a:prstGeom prst="rect">
             <a:avLst/>
           </a:prstGeom>
+          <a:noFill/>
         </p:spPr>
-        <p:style>
-          <a:lnRef idx="2">
-            <a:schemeClr val="dk1">
-              <a:shade val="50000"/>
-            </a:schemeClr>
-          </a:lnRef>
-          <a:fillRef idx="1">
-            <a:schemeClr val="dk1"/>
-          </a:fillRef>
-          <a:effectRef idx="0">
-            <a:schemeClr val="dk1"/>
-          </a:effectRef>
-          <a:fontRef idx="minor">
-            <a:schemeClr val="lt1"/>
-          </a:fontRef>
-        </p:style>
-        <p:txBody>
-          <a:bodyPr rtlCol="0" anchor="ctr"/>
+        <p:txBody>
+          <a:bodyPr wrap="square" rtlCol="0">
+            <a:spAutoFit/>
+          </a:bodyPr>
           <a:lstStyle/>
           <a:p>
-            <a:pPr algn="ctr"/>
-            <a:r>
-              <a:rPr lang="en-GB" sz="9600" u="sng" dirty="0">
-                <a:solidFill>
-                  <a:srgbClr val="FFC000"/>
-                </a:solidFill>
-              </a:rPr>
-              <a:t>Lore</a:t>
-            </a:r>
-            <a:r>
-              <a:rPr lang="en-GB" sz="9600" dirty="0">
-                <a:solidFill>
-                  <a:srgbClr val="FFC000"/>
-                </a:solidFill>
-              </a:rPr>
-              <a:t> </a:t>
-            </a:r>
-            <a:r>
-              <a:rPr lang="en-GB" sz="9600" u="sng" dirty="0">
-                <a:solidFill>
-                  <a:srgbClr val="FFC000"/>
-                </a:solidFill>
-              </a:rPr>
-              <a:t>Spoilers</a:t>
-            </a:r>
+            <a:r>
+              <a:rPr lang="en-GB" dirty="0"/>
+              <a:t>Stage two Objectives:</a:t>
+            </a:r>
+          </a:p>
+          <a:p>
+            <a:endParaRPr lang="en-GB" dirty="0"/>
+          </a:p>
+          <a:p>
+            <a:r>
+              <a:rPr lang="en-GB" dirty="0"/>
+              <a:t>Introduce a level select bar on the lefthand side. Next </a:t>
+            </a:r>
+            <a:r>
+              <a:rPr lang="en-GB" dirty="0" err="1"/>
+              <a:t>Div</a:t>
+            </a:r>
+            <a:r>
+              <a:rPr lang="en-GB" dirty="0"/>
+              <a:t> will become available after achieving a score of &gt; 50%. </a:t>
+            </a:r>
+          </a:p>
+          <a:p>
+            <a:endParaRPr lang="en-GB" dirty="0"/>
+          </a:p>
+          <a:p>
+            <a:r>
+              <a:rPr lang="en-GB" sz="2400" b="1" u="sng" dirty="0"/>
+              <a:t>Pseudo code for level select:</a:t>
+            </a:r>
+          </a:p>
+          <a:p>
+            <a:endParaRPr lang="en-GB" dirty="0"/>
+          </a:p>
+          <a:p>
+            <a:r>
+              <a:rPr lang="en-GB" dirty="0"/>
+              <a:t>Click level (</a:t>
+            </a:r>
+            <a:r>
+              <a:rPr lang="en-GB" dirty="0" err="1"/>
+              <a:t>event.target.value</a:t>
+            </a:r>
+            <a:r>
+              <a:rPr lang="en-GB" dirty="0"/>
+              <a:t> = current round number)</a:t>
+            </a:r>
+          </a:p>
+          <a:p>
+            <a:r>
+              <a:rPr lang="en-GB" dirty="0"/>
+              <a:t>If </a:t>
+            </a:r>
+            <a:r>
+              <a:rPr lang="en-GB" dirty="0" err="1"/>
+              <a:t>event.target.value</a:t>
+            </a:r>
+            <a:r>
+              <a:rPr lang="en-GB" dirty="0"/>
+              <a:t> &lt;= highest level available{</a:t>
+            </a:r>
+          </a:p>
+          <a:p>
+            <a:r>
+              <a:rPr lang="en-GB" dirty="0"/>
+              <a:t>Run handle round + </a:t>
+            </a:r>
+          </a:p>
+          <a:p>
+            <a:r>
+              <a:rPr lang="en-GB" dirty="0" err="1"/>
+              <a:t>setTimeOut</a:t>
+            </a:r>
+            <a:r>
+              <a:rPr lang="en-GB" dirty="0"/>
+              <a:t> timed to end of round that checks score &gt;= (</a:t>
+            </a:r>
+            <a:r>
+              <a:rPr lang="en-GB" dirty="0" err="1"/>
+              <a:t>totalgeese</a:t>
+            </a:r>
+            <a:r>
+              <a:rPr lang="en-GB" dirty="0"/>
+              <a:t> in round)/2</a:t>
+            </a:r>
+          </a:p>
+          <a:p>
+            <a:r>
+              <a:rPr lang="en-GB" dirty="0"/>
+              <a:t>If true and If </a:t>
+            </a:r>
+            <a:r>
+              <a:rPr lang="en-GB" dirty="0" err="1"/>
+              <a:t>event.target.value</a:t>
+            </a:r>
+            <a:r>
+              <a:rPr lang="en-GB" dirty="0"/>
+              <a:t> = highest level available </a:t>
+            </a:r>
+          </a:p>
+          <a:p>
+            <a:r>
+              <a:rPr lang="en-GB" dirty="0"/>
+              <a:t>	highest level available  = </a:t>
+            </a:r>
+            <a:r>
+              <a:rPr lang="en-GB" dirty="0" err="1"/>
+              <a:t>event.target.value</a:t>
+            </a:r>
+            <a:endParaRPr lang="en-GB" dirty="0"/>
+          </a:p>
+          <a:p>
+            <a:r>
+              <a:rPr lang="en-GB" dirty="0"/>
+              <a:t>Else do nothing as then the level must be played again</a:t>
+            </a:r>
+          </a:p>
+          <a:p>
+            <a:r>
+              <a:rPr lang="en-GB" dirty="0"/>
+              <a:t>	(can change the else statement another time)</a:t>
+            </a:r>
+          </a:p>
+          <a:p>
+            <a:r>
+              <a:rPr lang="en-GB" dirty="0"/>
+              <a:t>} Else {</a:t>
+            </a:r>
+          </a:p>
+          <a:p>
+            <a:r>
+              <a:rPr lang="en-GB" dirty="0"/>
+              <a:t>Alert player of level progression requirements. </a:t>
+            </a:r>
+          </a:p>
+          <a:p>
+            <a:r>
+              <a:rPr lang="en-GB" dirty="0"/>
+              <a:t>}</a:t>
+            </a:r>
+          </a:p>
+          <a:p>
+            <a:endParaRPr lang="en-GB" dirty="0"/>
           </a:p>
         </p:txBody>
       </p:sp>
     </p:spTree>
     <p:extLst>
       <p:ext uri="{BB962C8B-B14F-4D97-AF65-F5344CB8AC3E}">
-        <p14:creationId xmlns:p14="http://schemas.microsoft.com/office/powerpoint/2010/main" val="1199789277"/>
+        <p14:creationId xmlns:p14="http://schemas.microsoft.com/office/powerpoint/2010/main" val="1416501961"/>
       </p:ext>
     </p:extLst>
   </p:cSld>

</xml_diff>

<commit_message>
Final ppptx and its pdf conversion
</commit_message>
<xml_diff>
--- a/Goose-Feed-Game.pptx
+++ b/Goose-Feed-Game.pptx
@@ -15,7 +15,9 @@
     <p:sldId id="264" r:id="rId9"/>
     <p:sldId id="265" r:id="rId10"/>
     <p:sldId id="266" r:id="rId11"/>
-    <p:sldId id="261" r:id="rId12"/>
+    <p:sldId id="267" r:id="rId12"/>
+    <p:sldId id="268" r:id="rId13"/>
+    <p:sldId id="261" r:id="rId14"/>
   </p:sldIdLst>
   <p:sldSz cx="12192000" cy="6858000"/>
   <p:notesSz cx="6858000" cy="9144000"/>
@@ -271,7 +273,7 @@
           <a:p>
             <a:fld id="{A0061581-3EDB-4D8C-9A53-87B68CB6D996}" type="datetimeFigureOut">
               <a:rPr lang="en-GB" smtClean="0"/>
-              <a:t>31/01/2023</a:t>
+              <a:t>01/02/2023</a:t>
             </a:fld>
             <a:endParaRPr lang="en-GB"/>
           </a:p>
@@ -471,7 +473,7 @@
           <a:p>
             <a:fld id="{A0061581-3EDB-4D8C-9A53-87B68CB6D996}" type="datetimeFigureOut">
               <a:rPr lang="en-GB" smtClean="0"/>
-              <a:t>31/01/2023</a:t>
+              <a:t>01/02/2023</a:t>
             </a:fld>
             <a:endParaRPr lang="en-GB"/>
           </a:p>
@@ -681,7 +683,7 @@
           <a:p>
             <a:fld id="{A0061581-3EDB-4D8C-9A53-87B68CB6D996}" type="datetimeFigureOut">
               <a:rPr lang="en-GB" smtClean="0"/>
-              <a:t>31/01/2023</a:t>
+              <a:t>01/02/2023</a:t>
             </a:fld>
             <a:endParaRPr lang="en-GB"/>
           </a:p>
@@ -881,7 +883,7 @@
           <a:p>
             <a:fld id="{A0061581-3EDB-4D8C-9A53-87B68CB6D996}" type="datetimeFigureOut">
               <a:rPr lang="en-GB" smtClean="0"/>
-              <a:t>31/01/2023</a:t>
+              <a:t>01/02/2023</a:t>
             </a:fld>
             <a:endParaRPr lang="en-GB"/>
           </a:p>
@@ -1157,7 +1159,7 @@
           <a:p>
             <a:fld id="{A0061581-3EDB-4D8C-9A53-87B68CB6D996}" type="datetimeFigureOut">
               <a:rPr lang="en-GB" smtClean="0"/>
-              <a:t>31/01/2023</a:t>
+              <a:t>01/02/2023</a:t>
             </a:fld>
             <a:endParaRPr lang="en-GB"/>
           </a:p>
@@ -1425,7 +1427,7 @@
           <a:p>
             <a:fld id="{A0061581-3EDB-4D8C-9A53-87B68CB6D996}" type="datetimeFigureOut">
               <a:rPr lang="en-GB" smtClean="0"/>
-              <a:t>31/01/2023</a:t>
+              <a:t>01/02/2023</a:t>
             </a:fld>
             <a:endParaRPr lang="en-GB"/>
           </a:p>
@@ -1840,7 +1842,7 @@
           <a:p>
             <a:fld id="{A0061581-3EDB-4D8C-9A53-87B68CB6D996}" type="datetimeFigureOut">
               <a:rPr lang="en-GB" smtClean="0"/>
-              <a:t>31/01/2023</a:t>
+              <a:t>01/02/2023</a:t>
             </a:fld>
             <a:endParaRPr lang="en-GB"/>
           </a:p>
@@ -1982,7 +1984,7 @@
           <a:p>
             <a:fld id="{A0061581-3EDB-4D8C-9A53-87B68CB6D996}" type="datetimeFigureOut">
               <a:rPr lang="en-GB" smtClean="0"/>
-              <a:t>31/01/2023</a:t>
+              <a:t>01/02/2023</a:t>
             </a:fld>
             <a:endParaRPr lang="en-GB"/>
           </a:p>
@@ -2095,7 +2097,7 @@
           <a:p>
             <a:fld id="{A0061581-3EDB-4D8C-9A53-87B68CB6D996}" type="datetimeFigureOut">
               <a:rPr lang="en-GB" smtClean="0"/>
-              <a:t>31/01/2023</a:t>
+              <a:t>01/02/2023</a:t>
             </a:fld>
             <a:endParaRPr lang="en-GB"/>
           </a:p>
@@ -2408,7 +2410,7 @@
           <a:p>
             <a:fld id="{A0061581-3EDB-4D8C-9A53-87B68CB6D996}" type="datetimeFigureOut">
               <a:rPr lang="en-GB" smtClean="0"/>
-              <a:t>31/01/2023</a:t>
+              <a:t>01/02/2023</a:t>
             </a:fld>
             <a:endParaRPr lang="en-GB"/>
           </a:p>
@@ -2697,7 +2699,7 @@
           <a:p>
             <a:fld id="{A0061581-3EDB-4D8C-9A53-87B68CB6D996}" type="datetimeFigureOut">
               <a:rPr lang="en-GB" smtClean="0"/>
-              <a:t>31/01/2023</a:t>
+              <a:t>01/02/2023</a:t>
             </a:fld>
             <a:endParaRPr lang="en-GB"/>
           </a:p>
@@ -2940,7 +2942,7 @@
           <a:p>
             <a:fld id="{A0061581-3EDB-4D8C-9A53-87B68CB6D996}" type="datetimeFigureOut">
               <a:rPr lang="en-GB" smtClean="0"/>
-              <a:t>31/01/2023</a:t>
+              <a:t>01/02/2023</a:t>
             </a:fld>
             <a:endParaRPr lang="en-GB"/>
           </a:p>
@@ -3395,13 +3397,8 @@
             </a:r>
             <a:r>
               <a:rPr lang="en-GB" dirty="0"/>
-              <a:t> game. </a:t>
-            </a:r>
-            <a:r>
-              <a:rPr lang="en-GB"/>
-              <a:t>Geese Feed Game. </a:t>
-            </a:r>
-            <a:endParaRPr lang="en-GB" dirty="0"/>
+              <a:t> game. Geese Feed Game. </a:t>
+            </a:r>
           </a:p>
           <a:p>
             <a:endParaRPr lang="en-GB" dirty="0"/>
@@ -3788,7 +3785,7 @@
             </a:r>
             <a:r>
               <a:rPr lang="en-GB" sz="1400" dirty="0"/>
-              <a:t> = 0;</a:t>
+              <a:t> = 0; //initial position</a:t>
             </a:r>
           </a:p>
           <a:p>
@@ -3836,7 +3833,7 @@
             </a:r>
             <a:r>
               <a:rPr lang="en-GB" sz="1400" dirty="0"/>
-              <a:t> == 350) {</a:t>
+              <a:t> == 350) { //width of box</a:t>
             </a:r>
           </a:p>
           <a:p>
@@ -3900,7 +3897,7 @@
             </a:r>
             <a:r>
               <a:rPr lang="en-GB" sz="1400" dirty="0"/>
-              <a:t>'; </a:t>
+              <a:t>’;  //moves one pixel down every frame</a:t>
             </a:r>
           </a:p>
           <a:p>
@@ -3930,7 +3927,7 @@
             </a:r>
             <a:r>
               <a:rPr lang="en-GB" sz="1400" dirty="0"/>
-              <a:t>'; </a:t>
+              <a:t>’; // moves one pixel right every frame</a:t>
             </a:r>
           </a:p>
           <a:p>
@@ -4083,6 +4080,67 @@
           </a:fontRef>
         </p:style>
       </p:cxnSp>
+      <p:sp>
+        <p:nvSpPr>
+          <p:cNvPr id="2" name="TextBox 1">
+            <a:extLst>
+              <a:ext uri="{FF2B5EF4-FFF2-40B4-BE49-F238E27FC236}">
+                <a16:creationId xmlns:a16="http://schemas.microsoft.com/office/drawing/2014/main" id="{09F0C36C-F1A7-FB6F-FD21-E466BF26F4D6}"/>
+              </a:ext>
+            </a:extLst>
+          </p:cNvPr>
+          <p:cNvSpPr txBox="1"/>
+          <p:nvPr/>
+        </p:nvSpPr>
+        <p:spPr>
+          <a:xfrm>
+            <a:off x="6524427" y="2640563"/>
+            <a:ext cx="4774943" cy="2031325"/>
+          </a:xfrm>
+          <a:prstGeom prst="rect">
+            <a:avLst/>
+          </a:prstGeom>
+          <a:noFill/>
+        </p:spPr>
+        <p:txBody>
+          <a:bodyPr wrap="square" rtlCol="0">
+            <a:spAutoFit/>
+          </a:bodyPr>
+          <a:lstStyle/>
+          <a:p>
+            <a:r>
+              <a:rPr lang="en-GB" dirty="0"/>
+              <a:t>Left and top are x and y positions. To change angle of trajectory is the relation between them.</a:t>
+            </a:r>
+          </a:p>
+          <a:p>
+            <a:endParaRPr lang="en-GB" dirty="0"/>
+          </a:p>
+          <a:p>
+            <a:r>
+              <a:rPr lang="en-GB" dirty="0"/>
+              <a:t>If the angle is changed so must final </a:t>
+            </a:r>
+            <a:r>
+              <a:rPr lang="en-GB" dirty="0" err="1"/>
+              <a:t>pov</a:t>
+            </a:r>
+            <a:r>
+              <a:rPr lang="en-GB" dirty="0"/>
+              <a:t> value (divided by largest multiplier)</a:t>
+            </a:r>
+          </a:p>
+          <a:p>
+            <a:endParaRPr lang="en-GB" dirty="0"/>
+          </a:p>
+          <a:p>
+            <a:r>
+              <a:rPr lang="en-GB" dirty="0"/>
+              <a:t> </a:t>
+            </a:r>
+          </a:p>
+        </p:txBody>
+      </p:sp>
     </p:spTree>
     <p:extLst>
       <p:ext uri="{BB962C8B-B14F-4D97-AF65-F5344CB8AC3E}">
@@ -4097,6 +4155,523 @@
 </file>
 
 <file path=ppt/slides/slide11.xml><?xml version="1.0" encoding="utf-8"?>
+<p:sld xmlns:a="http://schemas.openxmlformats.org/drawingml/2006/main" xmlns:r="http://schemas.openxmlformats.org/officeDocument/2006/relationships" xmlns:p="http://schemas.openxmlformats.org/presentationml/2006/main">
+  <p:cSld>
+    <p:spTree>
+      <p:nvGrpSpPr>
+        <p:cNvPr id="1" name=""/>
+        <p:cNvGrpSpPr/>
+        <p:nvPr/>
+      </p:nvGrpSpPr>
+      <p:grpSpPr>
+        <a:xfrm>
+          <a:off x="0" y="0"/>
+          <a:ext cx="0" cy="0"/>
+          <a:chOff x="0" y="0"/>
+          <a:chExt cx="0" cy="0"/>
+        </a:xfrm>
+      </p:grpSpPr>
+      <p:sp>
+        <p:nvSpPr>
+          <p:cNvPr id="2" name="TextBox 1">
+            <a:extLst>
+              <a:ext uri="{FF2B5EF4-FFF2-40B4-BE49-F238E27FC236}">
+                <a16:creationId xmlns:a16="http://schemas.microsoft.com/office/drawing/2014/main" id="{31800B69-A1BA-0E59-70F4-87E7BB8D9BC9}"/>
+              </a:ext>
+            </a:extLst>
+          </p:cNvPr>
+          <p:cNvSpPr txBox="1"/>
+          <p:nvPr/>
+        </p:nvSpPr>
+        <p:spPr>
+          <a:xfrm>
+            <a:off x="681135" y="531845"/>
+            <a:ext cx="11510865" cy="2862322"/>
+          </a:xfrm>
+          <a:prstGeom prst="rect">
+            <a:avLst/>
+          </a:prstGeom>
+          <a:noFill/>
+        </p:spPr>
+        <p:txBody>
+          <a:bodyPr wrap="square" rtlCol="0">
+            <a:spAutoFit/>
+          </a:bodyPr>
+          <a:lstStyle/>
+          <a:p>
+            <a:r>
+              <a:rPr lang="en-GB" dirty="0"/>
+              <a:t>01/02 Tertiary JS goal almost complete.</a:t>
+            </a:r>
+          </a:p>
+          <a:p>
+            <a:endParaRPr lang="en-GB" dirty="0"/>
+          </a:p>
+          <a:p>
+            <a:r>
+              <a:rPr lang="en-GB" dirty="0"/>
+              <a:t>Known bugs that need fixing:</a:t>
+            </a:r>
+          </a:p>
+          <a:p>
+            <a:pPr marL="285750" indent="-285750">
+              <a:buFont typeface="Arial" panose="020B0604020202020204" pitchFamily="34" charset="0"/>
+              <a:buChar char="•"/>
+            </a:pPr>
+            <a:r>
+              <a:rPr lang="en-GB" dirty="0"/>
+              <a:t>Mode select needs to clear intervals </a:t>
+            </a:r>
+          </a:p>
+          <a:p>
+            <a:pPr marL="742950" lvl="1" indent="-285750">
+              <a:buFont typeface="Arial" panose="020B0604020202020204" pitchFamily="34" charset="0"/>
+              <a:buChar char="•"/>
+            </a:pPr>
+            <a:r>
+              <a:rPr lang="en-GB" dirty="0">
+                <a:solidFill>
+                  <a:srgbClr val="FF0000"/>
+                </a:solidFill>
+              </a:rPr>
+              <a:t>can’t clear intervals on level select so will lock players to level </a:t>
+            </a:r>
+            <a:r>
+              <a:rPr lang="en-GB" dirty="0">
+                <a:solidFill>
+                  <a:srgbClr val="00B050"/>
+                </a:solidFill>
+              </a:rPr>
+              <a:t>TICK </a:t>
+            </a:r>
+            <a:r>
+              <a:rPr lang="en-GB" dirty="0">
+                <a:solidFill>
+                  <a:srgbClr val="00B050"/>
+                </a:solidFill>
+                <a:sym typeface="Wingdings" panose="05000000000000000000" pitchFamily="2" charset="2"/>
+              </a:rPr>
+              <a:t></a:t>
+            </a:r>
+            <a:r>
+              <a:rPr lang="en-GB" dirty="0"/>
+              <a:t> </a:t>
+            </a:r>
+            <a:endParaRPr lang="en-GB" dirty="0">
+              <a:solidFill>
+                <a:srgbClr val="FF0000"/>
+              </a:solidFill>
+            </a:endParaRPr>
+          </a:p>
+          <a:p>
+            <a:pPr marL="285750" indent="-285750">
+              <a:buFont typeface="Arial" panose="020B0604020202020204" pitchFamily="34" charset="0"/>
+              <a:buChar char="•"/>
+            </a:pPr>
+            <a:r>
+              <a:rPr lang="en-GB" dirty="0"/>
+              <a:t>Selecting a round should reset all intervals </a:t>
+            </a:r>
+          </a:p>
+          <a:p>
+            <a:pPr marL="742950" lvl="1" indent="-285750">
+              <a:buFont typeface="Arial" panose="020B0604020202020204" pitchFamily="34" charset="0"/>
+              <a:buChar char="•"/>
+            </a:pPr>
+            <a:r>
+              <a:rPr lang="en-GB" dirty="0">
+                <a:solidFill>
+                  <a:srgbClr val="FF0000"/>
+                </a:solidFill>
+              </a:rPr>
+              <a:t>can’t clear intervals on level select so will lock players to level </a:t>
+            </a:r>
+            <a:r>
+              <a:rPr lang="en-GB" dirty="0">
+                <a:solidFill>
+                  <a:srgbClr val="00B050"/>
+                </a:solidFill>
+              </a:rPr>
+              <a:t>TICK </a:t>
+            </a:r>
+            <a:r>
+              <a:rPr lang="en-GB" dirty="0">
+                <a:solidFill>
+                  <a:srgbClr val="00B050"/>
+                </a:solidFill>
+                <a:sym typeface="Wingdings" panose="05000000000000000000" pitchFamily="2" charset="2"/>
+              </a:rPr>
+              <a:t></a:t>
+            </a:r>
+            <a:r>
+              <a:rPr lang="en-GB" dirty="0"/>
+              <a:t> </a:t>
+            </a:r>
+          </a:p>
+          <a:p>
+            <a:pPr marL="285750" indent="-285750">
+              <a:buFont typeface="Arial" panose="020B0604020202020204" pitchFamily="34" charset="0"/>
+              <a:buChar char="•"/>
+            </a:pPr>
+            <a:r>
+              <a:rPr lang="en-GB" dirty="0"/>
+              <a:t>Resetting the game should reset all intervals and variables.</a:t>
+            </a:r>
+          </a:p>
+          <a:p>
+            <a:pPr marL="285750" indent="-285750">
+              <a:buFont typeface="Arial" panose="020B0604020202020204" pitchFamily="34" charset="0"/>
+              <a:buChar char="•"/>
+            </a:pPr>
+            <a:r>
+              <a:rPr lang="en-GB" dirty="0"/>
+              <a:t>Mode select should save progress on each mode. </a:t>
+            </a:r>
+            <a:r>
+              <a:rPr lang="en-GB" dirty="0">
+                <a:solidFill>
+                  <a:srgbClr val="00B050"/>
+                </a:solidFill>
+              </a:rPr>
+              <a:t>TICK </a:t>
+            </a:r>
+            <a:r>
+              <a:rPr lang="en-GB" dirty="0">
+                <a:solidFill>
+                  <a:srgbClr val="00B050"/>
+                </a:solidFill>
+                <a:sym typeface="Wingdings" panose="05000000000000000000" pitchFamily="2" charset="2"/>
+              </a:rPr>
+              <a:t></a:t>
+            </a:r>
+            <a:r>
+              <a:rPr lang="en-GB" dirty="0"/>
+              <a:t> </a:t>
+            </a:r>
+          </a:p>
+          <a:p>
+            <a:pPr marL="742950" lvl="1" indent="-285750">
+              <a:buFont typeface="Arial" panose="020B0604020202020204" pitchFamily="34" charset="0"/>
+              <a:buChar char="•"/>
+            </a:pPr>
+            <a:r>
+              <a:rPr lang="en-GB" dirty="0"/>
+              <a:t>Note rounds available are currently saved but icons need to match those available </a:t>
+            </a:r>
+            <a:r>
+              <a:rPr lang="en-GB" dirty="0">
+                <a:solidFill>
+                  <a:srgbClr val="00B050"/>
+                </a:solidFill>
+              </a:rPr>
+              <a:t>TICK </a:t>
+            </a:r>
+            <a:r>
+              <a:rPr lang="en-GB" dirty="0">
+                <a:solidFill>
+                  <a:srgbClr val="00B050"/>
+                </a:solidFill>
+                <a:sym typeface="Wingdings" panose="05000000000000000000" pitchFamily="2" charset="2"/>
+              </a:rPr>
+              <a:t></a:t>
+            </a:r>
+            <a:r>
+              <a:rPr lang="en-GB" dirty="0"/>
+              <a:t> </a:t>
+            </a:r>
+          </a:p>
+        </p:txBody>
+      </p:sp>
+      <p:sp>
+        <p:nvSpPr>
+          <p:cNvPr id="3" name="TextBox 2">
+            <a:extLst>
+              <a:ext uri="{FF2B5EF4-FFF2-40B4-BE49-F238E27FC236}">
+                <a16:creationId xmlns:a16="http://schemas.microsoft.com/office/drawing/2014/main" id="{82000572-5CC2-A20F-6B9D-02C9098FE128}"/>
+              </a:ext>
+            </a:extLst>
+          </p:cNvPr>
+          <p:cNvSpPr txBox="1"/>
+          <p:nvPr/>
+        </p:nvSpPr>
+        <p:spPr>
+          <a:xfrm>
+            <a:off x="839755" y="3517641"/>
+            <a:ext cx="6895323" cy="1477328"/>
+          </a:xfrm>
+          <a:prstGeom prst="rect">
+            <a:avLst/>
+          </a:prstGeom>
+          <a:noFill/>
+        </p:spPr>
+        <p:txBody>
+          <a:bodyPr wrap="square" rtlCol="0">
+            <a:spAutoFit/>
+          </a:bodyPr>
+          <a:lstStyle/>
+          <a:p>
+            <a:r>
+              <a:rPr lang="en-GB" dirty="0"/>
+              <a:t>Next Goal after mode select complete.</a:t>
+            </a:r>
+          </a:p>
+          <a:p>
+            <a:r>
+              <a:rPr lang="en-GB" dirty="0"/>
+              <a:t>Taking into consideration timeframe achievable goals are: </a:t>
+            </a:r>
+          </a:p>
+          <a:p>
+            <a:r>
+              <a:rPr lang="en-GB" dirty="0"/>
+              <a:t>Endless mode </a:t>
+            </a:r>
+          </a:p>
+          <a:p>
+            <a:r>
+              <a:rPr lang="en-GB" dirty="0"/>
+              <a:t>Pretty SCSS </a:t>
+            </a:r>
+          </a:p>
+          <a:p>
+            <a:r>
+              <a:rPr lang="en-GB" dirty="0"/>
+              <a:t>Pop up overlay Instructions menu. </a:t>
+            </a:r>
+            <a:r>
+              <a:rPr lang="en-GB" dirty="0">
+                <a:solidFill>
+                  <a:srgbClr val="00B050"/>
+                </a:solidFill>
+              </a:rPr>
+              <a:t>TICK </a:t>
+            </a:r>
+            <a:r>
+              <a:rPr lang="en-GB" dirty="0">
+                <a:solidFill>
+                  <a:srgbClr val="00B050"/>
+                </a:solidFill>
+                <a:sym typeface="Wingdings" panose="05000000000000000000" pitchFamily="2" charset="2"/>
+              </a:rPr>
+              <a:t></a:t>
+            </a:r>
+            <a:r>
+              <a:rPr lang="en-GB" dirty="0"/>
+              <a:t> </a:t>
+            </a:r>
+          </a:p>
+        </p:txBody>
+      </p:sp>
+    </p:spTree>
+    <p:extLst>
+      <p:ext uri="{BB962C8B-B14F-4D97-AF65-F5344CB8AC3E}">
+        <p14:creationId xmlns:p14="http://schemas.microsoft.com/office/powerpoint/2010/main" val="2520088683"/>
+      </p:ext>
+    </p:extLst>
+  </p:cSld>
+  <p:clrMapOvr>
+    <a:masterClrMapping/>
+  </p:clrMapOvr>
+</p:sld>
+</file>
+
+<file path=ppt/slides/slide12.xml><?xml version="1.0" encoding="utf-8"?>
+<p:sld xmlns:a="http://schemas.openxmlformats.org/drawingml/2006/main" xmlns:r="http://schemas.openxmlformats.org/officeDocument/2006/relationships" xmlns:p="http://schemas.openxmlformats.org/presentationml/2006/main">
+  <p:cSld>
+    <p:spTree>
+      <p:nvGrpSpPr>
+        <p:cNvPr id="1" name=""/>
+        <p:cNvGrpSpPr/>
+        <p:nvPr/>
+      </p:nvGrpSpPr>
+      <p:grpSpPr>
+        <a:xfrm>
+          <a:off x="0" y="0"/>
+          <a:ext cx="0" cy="0"/>
+          <a:chOff x="0" y="0"/>
+          <a:chExt cx="0" cy="0"/>
+        </a:xfrm>
+      </p:grpSpPr>
+      <p:sp>
+        <p:nvSpPr>
+          <p:cNvPr id="2" name="TextBox 1">
+            <a:extLst>
+              <a:ext uri="{FF2B5EF4-FFF2-40B4-BE49-F238E27FC236}">
+                <a16:creationId xmlns:a16="http://schemas.microsoft.com/office/drawing/2014/main" id="{E0A0C45D-9AFE-31E4-535D-AAA1DD0BDAD3}"/>
+              </a:ext>
+            </a:extLst>
+          </p:cNvPr>
+          <p:cNvSpPr txBox="1"/>
+          <p:nvPr/>
+        </p:nvSpPr>
+        <p:spPr>
+          <a:xfrm>
+            <a:off x="847336" y="1175656"/>
+            <a:ext cx="4627984" cy="5078313"/>
+          </a:xfrm>
+          <a:prstGeom prst="rect">
+            <a:avLst/>
+          </a:prstGeom>
+          <a:noFill/>
+        </p:spPr>
+        <p:txBody>
+          <a:bodyPr wrap="square" rtlCol="0">
+            <a:spAutoFit/>
+          </a:bodyPr>
+          <a:lstStyle/>
+          <a:p>
+            <a:r>
+              <a:rPr lang="en-GB" dirty="0"/>
+              <a:t>Endless mode pseudo</a:t>
+            </a:r>
+          </a:p>
+          <a:p>
+            <a:r>
+              <a:rPr lang="en-GB" dirty="0"/>
+              <a:t>Endless = Set interval(</a:t>
+            </a:r>
+          </a:p>
+          <a:p>
+            <a:r>
+              <a:rPr lang="en-GB" dirty="0"/>
+              <a:t>if(miss 5 geese in a row endless ends and </a:t>
+            </a:r>
+            <a:r>
+              <a:rPr lang="en-GB" dirty="0" err="1"/>
+              <a:t>highscore</a:t>
+            </a:r>
+            <a:r>
+              <a:rPr lang="en-GB" dirty="0"/>
+              <a:t> is displayed) check is if score &lt; total geese-5</a:t>
+            </a:r>
+          </a:p>
+          <a:p>
+            <a:r>
+              <a:rPr lang="en-GB" dirty="0"/>
+              <a:t>Clear interval (endless)</a:t>
+            </a:r>
+          </a:p>
+          <a:p>
+            <a:r>
+              <a:rPr lang="en-GB" dirty="0"/>
+              <a:t>Else {</a:t>
+            </a:r>
+          </a:p>
+          <a:p>
+            <a:r>
+              <a:rPr lang="en-GB" dirty="0" err="1"/>
+              <a:t>Setinterval</a:t>
+            </a:r>
+            <a:r>
+              <a:rPr lang="en-GB" dirty="0"/>
+              <a:t>(()=&gt;{increase round},100)</a:t>
+            </a:r>
+          </a:p>
+          <a:p>
+            <a:r>
+              <a:rPr lang="en-GB" dirty="0"/>
+              <a:t>Create a goose html, += html into div, ensure it has its own id. </a:t>
+            </a:r>
+          </a:p>
+          <a:p>
+            <a:r>
+              <a:rPr lang="en-GB" dirty="0"/>
+              <a:t>Decide to random place it or launch it</a:t>
+            </a:r>
+          </a:p>
+          <a:p>
+            <a:r>
+              <a:rPr lang="en-GB" dirty="0"/>
+              <a:t>When random place it attach lifetime</a:t>
+            </a:r>
+          </a:p>
+          <a:p>
+            <a:r>
+              <a:rPr lang="en-GB" dirty="0"/>
+              <a:t>When random launch it attach velocity</a:t>
+            </a:r>
+          </a:p>
+          <a:p>
+            <a:r>
+              <a:rPr lang="en-GB" dirty="0"/>
+              <a:t>},10)</a:t>
+            </a:r>
+          </a:p>
+          <a:p>
+            <a:endParaRPr lang="en-GB" dirty="0"/>
+          </a:p>
+          <a:p>
+            <a:r>
+              <a:rPr lang="en-GB" dirty="0"/>
+              <a:t>Each one will have its own attributes</a:t>
+            </a:r>
+          </a:p>
+          <a:p>
+            <a:endParaRPr lang="en-GB" dirty="0"/>
+          </a:p>
+          <a:p>
+            <a:endParaRPr lang="en-GB" b="1" dirty="0"/>
+          </a:p>
+        </p:txBody>
+      </p:sp>
+      <p:sp>
+        <p:nvSpPr>
+          <p:cNvPr id="3" name="TextBox 2">
+            <a:extLst>
+              <a:ext uri="{FF2B5EF4-FFF2-40B4-BE49-F238E27FC236}">
+                <a16:creationId xmlns:a16="http://schemas.microsoft.com/office/drawing/2014/main" id="{C51DAAF6-F364-5FD4-FDE3-7F374FCD7623}"/>
+              </a:ext>
+            </a:extLst>
+          </p:cNvPr>
+          <p:cNvSpPr txBox="1"/>
+          <p:nvPr/>
+        </p:nvSpPr>
+        <p:spPr>
+          <a:xfrm>
+            <a:off x="5686425" y="2690336"/>
+            <a:ext cx="3314700" cy="1477328"/>
+          </a:xfrm>
+          <a:prstGeom prst="rect">
+            <a:avLst/>
+          </a:prstGeom>
+          <a:noFill/>
+        </p:spPr>
+        <p:txBody>
+          <a:bodyPr wrap="square" rtlCol="0">
+            <a:spAutoFit/>
+          </a:bodyPr>
+          <a:lstStyle/>
+          <a:p>
+            <a:r>
+              <a:rPr lang="en-GB" dirty="0"/>
+              <a:t>it starts a new “round” on each interval </a:t>
+            </a:r>
+          </a:p>
+          <a:p>
+            <a:endParaRPr lang="en-GB" dirty="0"/>
+          </a:p>
+          <a:p>
+            <a:r>
+              <a:rPr lang="en-GB" dirty="0"/>
+              <a:t>Attach round number to goose properties</a:t>
+            </a:r>
+          </a:p>
+        </p:txBody>
+      </p:sp>
+    </p:spTree>
+    <p:extLst>
+      <p:ext uri="{BB962C8B-B14F-4D97-AF65-F5344CB8AC3E}">
+        <p14:creationId xmlns:p14="http://schemas.microsoft.com/office/powerpoint/2010/main" val="3482159703"/>
+      </p:ext>
+    </p:extLst>
+  </p:cSld>
+  <p:clrMapOvr>
+    <a:masterClrMapping/>
+  </p:clrMapOvr>
+</p:sld>
+</file>
+
+<file path=ppt/slides/slide13.xml><?xml version="1.0" encoding="utf-8"?>
 <p:sld xmlns:a="http://schemas.openxmlformats.org/drawingml/2006/main" xmlns:r="http://schemas.openxmlformats.org/officeDocument/2006/relationships" xmlns:p="http://schemas.openxmlformats.org/presentationml/2006/main">
   <p:cSld>
     <p:spTree>

</xml_diff>